<commit_message>
update config format and some slides
</commit_message>
<xml_diff>
--- a/Microservice_plumbing_with_RabbitMQ.pptx
+++ b/Microservice_plumbing_with_RabbitMQ.pptx
@@ -329,11 +329,11 @@
         </c:dLbls>
         <c:gapWidth val="164"/>
         <c:overlap val="-35"/>
-        <c:axId val="368181112"/>
-        <c:axId val="233295888"/>
+        <c:axId val="419501400"/>
+        <c:axId val="419502576"/>
       </c:barChart>
       <c:catAx>
-        <c:axId val="368181112"/>
+        <c:axId val="419501400"/>
         <c:scaling>
           <c:orientation val="minMax"/>
         </c:scaling>
@@ -368,6 +368,7 @@
               </a:p>
             </c:rich>
           </c:tx>
+          <c:layout/>
           <c:overlay val="0"/>
           <c:spPr>
             <a:noFill/>
@@ -428,7 +429,7 @@
             <a:endParaRPr lang="en-US"/>
           </a:p>
         </c:txPr>
-        <c:crossAx val="233295888"/>
+        <c:crossAx val="419502576"/>
         <c:crosses val="autoZero"/>
         <c:auto val="1"/>
         <c:lblAlgn val="ctr"/>
@@ -436,7 +437,7 @@
         <c:noMultiLvlLbl val="0"/>
       </c:catAx>
       <c:valAx>
-        <c:axId val="233295888"/>
+        <c:axId val="419502576"/>
         <c:scaling>
           <c:orientation val="minMax"/>
         </c:scaling>
@@ -476,6 +477,7 @@
               </a:p>
             </c:rich>
           </c:tx>
+          <c:layout/>
           <c:overlay val="0"/>
           <c:spPr>
             <a:noFill/>
@@ -538,7 +540,7 @@
             <a:endParaRPr lang="en-US"/>
           </a:p>
         </c:txPr>
-        <c:crossAx val="368181112"/>
+        <c:crossAx val="419501400"/>
         <c:crosses val="autoZero"/>
         <c:crossBetween val="between"/>
       </c:valAx>
@@ -552,6 +554,7 @@
     </c:plotArea>
     <c:legend>
       <c:legendPos val="t"/>
+      <c:layout/>
       <c:overlay val="0"/>
       <c:spPr>
         <a:noFill/>
@@ -1215,7 +1218,7 @@
           <a:p>
             <a:fld id="{FE5B4EDC-59C0-49C7-8ADA-5A781B329E02}" type="datetimeFigureOut">
               <a:rPr lang="en-US"/>
-              <a:t>9/27/2019</a:t>
+              <a:t>9/29/2019</a:t>
             </a:fld>
             <a:endParaRPr/>
           </a:p>
@@ -1380,7 +1383,7 @@
           <a:p>
             <a:fld id="{F2D8D46A-B586-417D-BFBD-8C8FE0AAF762}" type="datetimeFigureOut">
               <a:rPr lang="en-US"/>
-              <a:t>9/27/2019</a:t>
+              <a:t>9/29/2019</a:t>
             </a:fld>
             <a:endParaRPr/>
           </a:p>
@@ -1846,8 +1849,121 @@
             </a:r>
             <a:r>
               <a:rPr lang="en-US" baseline="0" dirty="0" smtClean="0"/>
-              <a:t> endpoints</a:t>
-            </a:r>
+              <a:t> </a:t>
+            </a:r>
+            <a:r>
+              <a:rPr lang="en-US" baseline="0" dirty="0" smtClean="0"/>
+              <a:t>endpoints (</a:t>
+            </a:r>
+            <a:r>
+              <a:rPr lang="en-US" dirty="0" smtClean="0">
+                <a:hlinkClick r:id="rId3"/>
+              </a:rPr>
+              <a:t>https://martinfowler.com/articles/microservices.html</a:t>
+            </a:r>
+            <a:r>
+              <a:rPr lang="en-US" dirty="0" smtClean="0"/>
+              <a:t>)</a:t>
+            </a:r>
+            <a:endParaRPr lang="en-US" baseline="0" dirty="0" smtClean="0"/>
+          </a:p>
+          <a:p>
+            <a:pPr marL="900672" marR="0" lvl="1" indent="-291179" algn="l" defTabSz="1218987" rtl="0" eaLnBrk="1" fontAlgn="auto" latinLnBrk="0" hangingPunct="1">
+              <a:lnSpc>
+                <a:spcPct val="100000"/>
+              </a:lnSpc>
+              <a:spcBef>
+                <a:spcPts val="0"/>
+              </a:spcBef>
+              <a:spcAft>
+                <a:spcPts val="0"/>
+              </a:spcAft>
+              <a:buClrTx/>
+              <a:buSzTx/>
+              <a:buFont typeface="Arial" panose="020B0604020202020204" pitchFamily="34" charset="0"/>
+              <a:buChar char="•"/>
+              <a:tabLst/>
+              <a:defRPr/>
+            </a:pPr>
+            <a:r>
+              <a:rPr lang="en-US" sz="1600" b="0" i="0" kern="1200" dirty="0" smtClean="0">
+                <a:solidFill>
+                  <a:schemeClr val="tx1"/>
+                </a:solidFill>
+                <a:effectLst/>
+                <a:latin typeface="+mn-lt"/>
+                <a:ea typeface="+mn-ea"/>
+                <a:cs typeface="+mn-cs"/>
+              </a:rPr>
+              <a:t>simple implementations such as </a:t>
+            </a:r>
+            <a:r>
+              <a:rPr lang="en-US" sz="1600" b="0" i="0" kern="1200" dirty="0" err="1" smtClean="0">
+                <a:solidFill>
+                  <a:schemeClr val="tx1"/>
+                </a:solidFill>
+                <a:effectLst/>
+                <a:latin typeface="+mn-lt"/>
+                <a:ea typeface="+mn-ea"/>
+                <a:cs typeface="+mn-cs"/>
+              </a:rPr>
+              <a:t>RabbitMQ</a:t>
+            </a:r>
+            <a:r>
+              <a:rPr lang="en-US" sz="1600" b="0" i="0" kern="1200" dirty="0" smtClean="0">
+                <a:solidFill>
+                  <a:schemeClr val="tx1"/>
+                </a:solidFill>
+                <a:effectLst/>
+                <a:latin typeface="+mn-lt"/>
+                <a:ea typeface="+mn-ea"/>
+                <a:cs typeface="+mn-cs"/>
+              </a:rPr>
+              <a:t> or </a:t>
+            </a:r>
+            <a:r>
+              <a:rPr lang="en-US" sz="1600" b="0" i="0" kern="1200" dirty="0" err="1" smtClean="0">
+                <a:solidFill>
+                  <a:schemeClr val="tx1"/>
+                </a:solidFill>
+                <a:effectLst/>
+                <a:latin typeface="+mn-lt"/>
+                <a:ea typeface="+mn-ea"/>
+                <a:cs typeface="+mn-cs"/>
+              </a:rPr>
+              <a:t>ZeroMQ</a:t>
+            </a:r>
+            <a:r>
+              <a:rPr lang="en-US" sz="1600" b="0" i="0" kern="1200" dirty="0" smtClean="0">
+                <a:solidFill>
+                  <a:schemeClr val="tx1"/>
+                </a:solidFill>
+                <a:effectLst/>
+                <a:latin typeface="+mn-lt"/>
+                <a:ea typeface="+mn-ea"/>
+                <a:cs typeface="+mn-cs"/>
+              </a:rPr>
+              <a:t> don't do much more than provide a reliable asynchronous fabric - the smarts still live in the end points that are producing and consuming messages; in the services.</a:t>
+            </a:r>
+          </a:p>
+          <a:p>
+            <a:pPr marL="900672" marR="0" lvl="1" indent="-291179" algn="l" defTabSz="1218987" rtl="0" eaLnBrk="1" fontAlgn="auto" latinLnBrk="0" hangingPunct="1">
+              <a:lnSpc>
+                <a:spcPct val="100000"/>
+              </a:lnSpc>
+              <a:spcBef>
+                <a:spcPts val="0"/>
+              </a:spcBef>
+              <a:spcAft>
+                <a:spcPts val="0"/>
+              </a:spcAft>
+              <a:buClrTx/>
+              <a:buSzTx/>
+              <a:buFont typeface="Arial" panose="020B0604020202020204" pitchFamily="34" charset="0"/>
+              <a:buChar char="•"/>
+              <a:tabLst/>
+              <a:defRPr/>
+            </a:pPr>
             <a:endParaRPr lang="en-US" dirty="0" smtClean="0"/>
           </a:p>
           <a:p>
@@ -3909,6 +4025,55 @@
             <a:endParaRPr lang="en-US" dirty="0" smtClean="0"/>
           </a:p>
           <a:p>
+            <a:endParaRPr lang="en-US" dirty="0" smtClean="0"/>
+          </a:p>
+          <a:p>
+            <a:r>
+              <a:rPr lang="en-US" dirty="0" smtClean="0"/>
+              <a:t>0-9-1 (</a:t>
+            </a:r>
+            <a:r>
+              <a:rPr lang="en-US" dirty="0" smtClean="0">
+                <a:hlinkClick r:id="rId3"/>
+              </a:rPr>
+              <a:t>https://www.rabbitmq.com/resources/specs/amqp0-9-1.pdf</a:t>
+            </a:r>
+            <a:r>
+              <a:rPr lang="en-US" dirty="0" smtClean="0"/>
+              <a:t>)</a:t>
+            </a:r>
+          </a:p>
+          <a:p>
+            <a:pPr marL="285750" indent="-285750">
+              <a:buFont typeface="Arial" panose="020B0604020202020204" pitchFamily="34" charset="0"/>
+              <a:buChar char="•"/>
+            </a:pPr>
+            <a:r>
+              <a:rPr lang="en-US" dirty="0" smtClean="0"/>
+              <a:t>The AMQ model consists of a set of components that route and store messages within the broker service, plus a set of rules for wiring these components together.</a:t>
+            </a:r>
+          </a:p>
+          <a:p>
+            <a:pPr marL="285750" indent="-285750">
+              <a:buFont typeface="Arial" panose="020B0604020202020204" pitchFamily="34" charset="0"/>
+              <a:buChar char="•"/>
+            </a:pPr>
+            <a:endParaRPr lang="en-US" dirty="0" smtClean="0"/>
+          </a:p>
+          <a:p>
+            <a:pPr marL="285750" indent="-285750">
+              <a:buFont typeface="Arial" panose="020B0604020202020204" pitchFamily="34" charset="0"/>
+              <a:buChar char="•"/>
+            </a:pPr>
+            <a:r>
+              <a:rPr lang="en-US" dirty="0" smtClean="0"/>
+              <a:t>A network wire-level protocol, AMQP, that lets client applications talk to the server and interact with the AMQ model it implements</a:t>
+            </a:r>
+          </a:p>
+          <a:p>
+            <a:endParaRPr lang="en-US" dirty="0" smtClean="0"/>
+          </a:p>
+          <a:p>
             <a:r>
               <a:rPr lang="en-US" dirty="0"/>
               <a:t>AMQP was originated in 2003 by John O'Hara at JPMorgan Chase in London.</a:t>
@@ -3953,25 +4118,6 @@
             </a:r>
           </a:p>
           <a:p>
-            <a:endParaRPr lang="en-US" dirty="0"/>
-          </a:p>
-          <a:p>
-            <a:r>
-              <a:rPr lang="en-US" dirty="0"/>
-              <a:t>The working group grew to 23 companies</a:t>
-            </a:r>
-          </a:p>
-          <a:p>
-            <a:endParaRPr lang="en-US" dirty="0"/>
-          </a:p>
-          <a:p>
-            <a:r>
-              <a:rPr lang="en-US" dirty="0"/>
-              <a:t>In August 2011, the AMQP working group announced its reorganization into an OASIS member section.</a:t>
-            </a:r>
-            <a:endParaRPr lang="en-US" baseline="30000" dirty="0"/>
-          </a:p>
-          <a:p>
             <a:endParaRPr lang="en-US" dirty="0" smtClean="0"/>
           </a:p>
           <a:p>
@@ -3985,25 +4131,13 @@
             </a:r>
             <a:r>
               <a:rPr lang="en-US" dirty="0"/>
-              <a:t>primarily supports AMQP 0-9-1, with 1.0 via experimental plugin</a:t>
-            </a:r>
-          </a:p>
-          <a:p>
+              <a:t>primarily supports AMQP 0-9-1, with 1.0 via experimental </a:t>
+            </a:r>
+            <a:r>
+              <a:rPr lang="en-US" dirty="0" smtClean="0"/>
+              <a:t>plugin</a:t>
+            </a:r>
             <a:endParaRPr lang="en-US" dirty="0"/>
-          </a:p>
-          <a:p>
-            <a:r>
-              <a:rPr lang="en-US" dirty="0"/>
-              <a:t>PL – Java, </a:t>
-            </a:r>
-            <a:r>
-              <a:rPr lang="en-US" dirty="0" err="1"/>
-              <a:t>.Net</a:t>
-            </a:r>
-            <a:r>
-              <a:rPr lang="en-US" dirty="0"/>
-              <a:t>, Windows, and Linux.</a:t>
-            </a:r>
           </a:p>
         </p:txBody>
       </p:sp>
@@ -4097,7 +4231,31 @@
                 <a:ea typeface="+mn-ea"/>
                 <a:cs typeface="+mn-cs"/>
               </a:rPr>
-              <a:t>There are four building blocks you really care about in AMQP: virtual hosts, exchanges, queues and bindings</a:t>
+              <a:t>There are four building blocks you really care about in AMQP: </a:t>
+            </a:r>
+            <a:r>
+              <a:rPr lang="en-US" sz="1600" b="0" i="0" kern="1200" dirty="0" smtClean="0">
+                <a:solidFill>
+                  <a:schemeClr val="tx1"/>
+                </a:solidFill>
+                <a:effectLst/>
+                <a:latin typeface="+mn-lt"/>
+                <a:ea typeface="+mn-ea"/>
+                <a:cs typeface="+mn-cs"/>
+              </a:rPr>
+              <a:t>virtual hosts, exchanges</a:t>
+            </a:r>
+            <a:r>
+              <a:rPr lang="en-US" sz="1600" b="0" i="0" kern="1200" dirty="0" smtClean="0">
+                <a:solidFill>
+                  <a:schemeClr val="tx1"/>
+                </a:solidFill>
+                <a:effectLst/>
+                <a:latin typeface="+mn-lt"/>
+                <a:ea typeface="+mn-ea"/>
+                <a:cs typeface="+mn-cs"/>
+              </a:rPr>
+              <a:t>, queues and bindings</a:t>
             </a:r>
           </a:p>
           <a:p>
@@ -4122,10 +4280,40 @@
                 <a:ea typeface="+mn-ea"/>
                 <a:cs typeface="+mn-cs"/>
               </a:rPr>
-              <a:t>  - A virtual host holds a bundle of exchanges, queues and bindings</a:t>
-            </a:r>
-          </a:p>
-          <a:p>
+              <a:t> - Queues are where your “messages” end up. They’re message </a:t>
+            </a:r>
+            <a:r>
+              <a:rPr lang="en-US" sz="1600" b="0" i="0" kern="1200" dirty="0" smtClean="0">
+                <a:solidFill>
+                  <a:schemeClr val="tx1"/>
+                </a:solidFill>
+                <a:effectLst/>
+                <a:latin typeface="+mn-lt"/>
+                <a:ea typeface="+mn-ea"/>
+                <a:cs typeface="+mn-cs"/>
+              </a:rPr>
+              <a:t>buckets. </a:t>
+            </a:r>
+          </a:p>
+          <a:p>
+            <a:pPr marL="895243" lvl="1" indent="-285750">
+              <a:buFont typeface="Arial" panose="020B0604020202020204" pitchFamily="34" charset="0"/>
+              <a:buChar char="•"/>
+            </a:pPr>
+            <a:r>
+              <a:rPr lang="en-US" dirty="0" smtClean="0"/>
+              <a:t>A message queue is a named FIFO buffer that holds message on behalf of a set of consumer applications.</a:t>
+            </a:r>
+          </a:p>
+          <a:p>
+            <a:pPr marL="895243" lvl="1" indent="-285750">
+              <a:buFont typeface="Arial" panose="020B0604020202020204" pitchFamily="34" charset="0"/>
+              <a:buChar char="•"/>
+            </a:pPr>
+            <a:r>
+              <a:rPr lang="en-US" dirty="0" smtClean="0"/>
+              <a:t>The only way to guarantee FIFO is to have just one consumer connected to a queue. </a:t>
+            </a:r>
             <a:endParaRPr lang="en-US" sz="1600" b="0" i="0" kern="1200" dirty="0" smtClean="0">
               <a:solidFill>
                 <a:schemeClr val="tx1"/>
@@ -4135,20 +4323,6 @@
               <a:ea typeface="+mn-ea"/>
               <a:cs typeface="+mn-cs"/>
             </a:endParaRPr>
-          </a:p>
-          <a:p>
-            <a:r>
-              <a:rPr lang="en-US" sz="1600" b="0" i="0" kern="1200" dirty="0" smtClean="0">
-                <a:solidFill>
-                  <a:schemeClr val="tx1"/>
-                </a:solidFill>
-                <a:effectLst/>
-                <a:latin typeface="+mn-lt"/>
-                <a:ea typeface="+mn-ea"/>
-                <a:cs typeface="+mn-cs"/>
-              </a:rPr>
-              <a:t> - Queues are where your “messages” end up. They’re message buckets</a:t>
-            </a:r>
           </a:p>
           <a:p>
             <a:endParaRPr lang="en-US" sz="1600" b="0" i="0" kern="1200" dirty="0" smtClean="0">
@@ -4303,10 +4477,69 @@
               <a:t> </a:t>
             </a:r>
             <a:r>
+              <a:rPr lang="en-US" dirty="0" smtClean="0"/>
+              <a:t>quick demo - </a:t>
+            </a:r>
+            <a:r>
               <a:rPr lang="en-US" dirty="0" smtClean="0">
                 <a:hlinkClick r:id="rId3"/>
               </a:rPr>
-              <a:t>https://www.cloudamqp.com/</a:t>
+              <a:t>https://customer.cloudamqp.com/instance</a:t>
+            </a:r>
+            <a:endParaRPr lang="en-US" dirty="0" smtClean="0"/>
+          </a:p>
+          <a:p>
+            <a:pPr marL="0" indent="0" defTabSz="1242148">
+              <a:buFont typeface="Arial" panose="020B0604020202020204" pitchFamily="34" charset="0"/>
+              <a:buNone/>
+              <a:defRPr/>
+            </a:pPr>
+            <a:endParaRPr lang="en-US" dirty="0" smtClean="0"/>
+          </a:p>
+          <a:p>
+            <a:pPr marL="0" indent="0" defTabSz="1242148">
+              <a:buFont typeface="Arial" panose="020B0604020202020204" pitchFamily="34" charset="0"/>
+              <a:buNone/>
+              <a:defRPr/>
+            </a:pPr>
+            <a:r>
+              <a:rPr lang="en-US" dirty="0" smtClean="0"/>
+              <a:t>Things to mention</a:t>
+            </a:r>
+            <a:r>
+              <a:rPr lang="en-US" baseline="0" dirty="0" smtClean="0"/>
+              <a:t> when looking at the UI</a:t>
+            </a:r>
+            <a:endParaRPr lang="en-US" dirty="0" smtClean="0"/>
+          </a:p>
+          <a:p>
+            <a:pPr marL="0" indent="0" defTabSz="1242148">
+              <a:buFont typeface="Arial" panose="020B0604020202020204" pitchFamily="34" charset="0"/>
+              <a:buNone/>
+              <a:defRPr/>
+            </a:pPr>
+            <a:endParaRPr lang="en-US" dirty="0" smtClean="0"/>
+          </a:p>
+          <a:p>
+            <a:pPr marL="285750" indent="-285750" defTabSz="1242148">
+              <a:buFont typeface="Arial" panose="020B0604020202020204" pitchFamily="34" charset="0"/>
+              <a:buChar char="•"/>
+              <a:defRPr/>
+            </a:pPr>
+            <a:r>
+              <a:rPr lang="en-US" dirty="0" smtClean="0"/>
+              <a:t>Connection: A network connection, e.g. a TCP/IP socket connection. </a:t>
+            </a:r>
+          </a:p>
+          <a:p>
+            <a:pPr marL="285750" indent="-285750" defTabSz="1242148">
+              <a:buFont typeface="Arial" panose="020B0604020202020204" pitchFamily="34" charset="0"/>
+              <a:buChar char="•"/>
+              <a:defRPr/>
+            </a:pPr>
+            <a:r>
+              <a:rPr lang="en-US" dirty="0" smtClean="0"/>
+              <a:t>Channel: A bi-directional stream of communications between two AMQP peers. Channels are multiplexed so that a single network connection can carry multiple channels.</a:t>
             </a:r>
             <a:endParaRPr lang="en-US" dirty="0" smtClean="0"/>
           </a:p>
@@ -4402,13 +4635,21 @@
           <a:p>
             <a:r>
               <a:rPr lang="en-US" b="1" dirty="0" smtClean="0"/>
-              <a:t>Breaking up a monolith</a:t>
+              <a:t>Breaking up a </a:t>
+            </a:r>
+            <a:r>
+              <a:rPr lang="en-US" b="1" dirty="0" smtClean="0"/>
+              <a:t>monolith</a:t>
             </a:r>
           </a:p>
           <a:p>
             <a:r>
               <a:rPr lang="en-US" dirty="0" smtClean="0"/>
-              <a:t>Teams work in small teams organized around business domains</a:t>
+              <a:t>Teams </a:t>
+            </a:r>
+            <a:r>
+              <a:rPr lang="en-US" dirty="0" smtClean="0"/>
+              <a:t>work in small teams organized around business domains</a:t>
             </a:r>
           </a:p>
           <a:p>
@@ -4440,57 +4681,6 @@
             <a:r>
               <a:rPr lang="en-US" dirty="0" smtClean="0"/>
               <a:t>We needed messaging but unsure what topology was needed.</a:t>
-            </a:r>
-          </a:p>
-          <a:p>
-            <a:endParaRPr lang="en-US" dirty="0" smtClean="0"/>
-          </a:p>
-          <a:p>
-            <a:pPr marL="457200" indent="-457200">
-              <a:buFont typeface="+mj-lt"/>
-              <a:buAutoNum type="arabicPeriod"/>
-            </a:pPr>
-            <a:r>
-              <a:rPr lang="en-US" dirty="0" err="1" smtClean="0"/>
-              <a:t>RabbitMQ</a:t>
-            </a:r>
-            <a:r>
-              <a:rPr lang="en-US" dirty="0" smtClean="0"/>
-              <a:t>  moved out of Docker (QE and higher)</a:t>
-            </a:r>
-          </a:p>
-          <a:p>
-            <a:pPr marL="457200" indent="-457200">
-              <a:buFont typeface="+mj-lt"/>
-              <a:buAutoNum type="arabicPeriod"/>
-            </a:pPr>
-            <a:r>
-              <a:rPr lang="en-US" dirty="0" smtClean="0"/>
-              <a:t>Deployment and configuration done via Chef.</a:t>
-            </a:r>
-          </a:p>
-          <a:p>
-            <a:pPr marL="457200" indent="-457200">
-              <a:buFont typeface="+mj-lt"/>
-              <a:buAutoNum type="arabicPeriod"/>
-            </a:pPr>
-            <a:r>
-              <a:rPr lang="en-US" dirty="0" err="1" smtClean="0"/>
-              <a:t>RabbitMQ</a:t>
-            </a:r>
-            <a:r>
-              <a:rPr lang="en-US" dirty="0" smtClean="0"/>
-              <a:t> HA and clustering setup</a:t>
-            </a:r>
-          </a:p>
-          <a:p>
-            <a:pPr marL="457200" indent="-457200">
-              <a:buFont typeface="+mj-lt"/>
-              <a:buAutoNum type="arabicPeriod"/>
-            </a:pPr>
-            <a:r>
-              <a:rPr lang="en-US" dirty="0" smtClean="0"/>
-              <a:t>Message topologies continue to evolve</a:t>
             </a:r>
           </a:p>
           <a:p>
@@ -5036,7 +5226,7 @@
           <a:p>
             <a:fld id="{425A5273-4A92-4E2B-A616-9C53CA80431D}" type="datetime1">
               <a:rPr lang="en-US" smtClean="0"/>
-              <a:t>9/27/2019</a:t>
+              <a:t>9/29/2019</a:t>
             </a:fld>
             <a:endParaRPr lang="en-US"/>
           </a:p>
@@ -5260,7 +5450,7 @@
           <a:p>
             <a:fld id="{B0104835-0441-4E5E-9C58-BB74718A1C90}" type="datetime1">
               <a:rPr lang="en-US" smtClean="0"/>
-              <a:t>9/27/2019</a:t>
+              <a:t>9/29/2019</a:t>
             </a:fld>
             <a:endParaRPr lang="en-US"/>
           </a:p>
@@ -5532,7 +5722,7 @@
           <a:p>
             <a:fld id="{38162AD8-BBAE-4395-88CD-AD98819C927A}" type="datetime1">
               <a:rPr lang="en-US" smtClean="0"/>
-              <a:t>9/27/2019</a:t>
+              <a:t>9/29/2019</a:t>
             </a:fld>
             <a:endParaRPr lang="en-US"/>
           </a:p>
@@ -5722,7 +5912,7 @@
           <a:p>
             <a:fld id="{7EBD01FE-FCB7-49C9-B76B-55C61E2568EB}" type="datetime1">
               <a:rPr lang="en-US" smtClean="0"/>
-              <a:t>9/27/2019</a:t>
+              <a:t>9/29/2019</a:t>
             </a:fld>
             <a:endParaRPr lang="en-US"/>
           </a:p>
@@ -6081,7 +6271,7 @@
           <a:p>
             <a:fld id="{0EEE6AE0-BDDC-46E2-9CF1-E764D02D076B}" type="datetime1">
               <a:rPr lang="en-US" smtClean="0"/>
-              <a:t>9/27/2019</a:t>
+              <a:t>9/29/2019</a:t>
             </a:fld>
             <a:endParaRPr lang="en-US"/>
           </a:p>
@@ -6372,7 +6562,7 @@
           <a:p>
             <a:fld id="{5574084E-0E11-4C80-84A0-CE7193FA4654}" type="datetime1">
               <a:rPr lang="en-US" smtClean="0"/>
-              <a:t>9/27/2019</a:t>
+              <a:t>9/29/2019</a:t>
             </a:fld>
             <a:endParaRPr lang="en-US"/>
           </a:p>
@@ -6767,7 +6957,7 @@
           <a:p>
             <a:fld id="{F9641FBB-4AD5-4348-AAFA-9C7D16E116A1}" type="datetime1">
               <a:rPr lang="en-US" smtClean="0"/>
-              <a:t>9/27/2019</a:t>
+              <a:t>9/29/2019</a:t>
             </a:fld>
             <a:endParaRPr lang="en-US"/>
           </a:p>
@@ -6901,7 +7091,7 @@
           <a:p>
             <a:fld id="{CB8E17E8-F59F-4736-A5AF-C5DA5082F4C4}" type="datetime1">
               <a:rPr lang="en-US" smtClean="0"/>
-              <a:t>9/27/2019</a:t>
+              <a:t>9/29/2019</a:t>
             </a:fld>
             <a:endParaRPr lang="en-US"/>
           </a:p>
@@ -7088,7 +7278,7 @@
           <a:p>
             <a:fld id="{0C0D84EB-296C-4D32-AF08-529ACD4137FA}" type="datetime1">
               <a:rPr lang="en-US" smtClean="0"/>
-              <a:t>9/27/2019</a:t>
+              <a:t>9/29/2019</a:t>
             </a:fld>
             <a:endParaRPr lang="en-US"/>
           </a:p>
@@ -7458,7 +7648,7 @@
           <a:p>
             <a:fld id="{811775C6-CCB8-4FF4-BDF0-E6FD5927766D}" type="datetime1">
               <a:rPr lang="en-US" smtClean="0"/>
-              <a:t>9/27/2019</a:t>
+              <a:t>9/29/2019</a:t>
             </a:fld>
             <a:endParaRPr lang="en-US"/>
           </a:p>
@@ -7856,7 +8046,7 @@
           <a:p>
             <a:fld id="{71A976D0-1055-4775-B26A-B26F49EB2AC6}" type="datetime1">
               <a:rPr lang="en-US" smtClean="0"/>
-              <a:t>9/27/2019</a:t>
+              <a:t>9/29/2019</a:t>
             </a:fld>
             <a:endParaRPr lang="en-US"/>
           </a:p>
@@ -8159,7 +8349,7 @@
           <a:p>
             <a:fld id="{570E9A61-A31B-44AF-81D7-DB6DE242223A}" type="datetime1">
               <a:rPr lang="en-US" smtClean="0"/>
-              <a:t>9/27/2019</a:t>
+              <a:t>9/29/2019</a:t>
             </a:fld>
             <a:endParaRPr lang="en-US"/>
           </a:p>
@@ -9079,7 +9269,7 @@
           <p:cNvPr id="2" name="Title 1">
             <a:extLst>
               <a:ext uri="{FF2B5EF4-FFF2-40B4-BE49-F238E27FC236}">
-                <a16:creationId xmlns="" xmlns:a16="http://schemas.microsoft.com/office/drawing/2014/main" id="{21A62E6F-8298-1C47-AF4C-D6B380DC5E27}"/>
+                <a16:creationId xmlns:a16="http://schemas.microsoft.com/office/drawing/2014/main" xmlns="" id="{21A62E6F-8298-1C47-AF4C-D6B380DC5E27}"/>
               </a:ext>
             </a:extLst>
           </p:cNvPr>
@@ -9112,7 +9302,7 @@
           <p:cNvPr id="3" name="Content Placeholder 2">
             <a:extLst>
               <a:ext uri="{FF2B5EF4-FFF2-40B4-BE49-F238E27FC236}">
-                <a16:creationId xmlns="" xmlns:a16="http://schemas.microsoft.com/office/drawing/2014/main" id="{B8E69FE9-10A4-C042-92DF-E8733DFFC11A}"/>
+                <a16:creationId xmlns:a16="http://schemas.microsoft.com/office/drawing/2014/main" xmlns="" id="{B8E69FE9-10A4-C042-92DF-E8733DFFC11A}"/>
               </a:ext>
             </a:extLst>
           </p:cNvPr>
@@ -9287,7 +9477,7 @@
           <p:cNvPr id="2" name="Title 1">
             <a:extLst>
               <a:ext uri="{FF2B5EF4-FFF2-40B4-BE49-F238E27FC236}">
-                <a16:creationId xmlns="" xmlns:a16="http://schemas.microsoft.com/office/drawing/2014/main" id="{3361FBBD-A24C-6D42-8F8A-A6AA065CB091}"/>
+                <a16:creationId xmlns:a16="http://schemas.microsoft.com/office/drawing/2014/main" xmlns="" id="{3361FBBD-A24C-6D42-8F8A-A6AA065CB091}"/>
               </a:ext>
             </a:extLst>
           </p:cNvPr>
@@ -9320,7 +9510,7 @@
           <p:cNvPr id="3" name="Content Placeholder 2">
             <a:extLst>
               <a:ext uri="{FF2B5EF4-FFF2-40B4-BE49-F238E27FC236}">
-                <a16:creationId xmlns="" xmlns:a16="http://schemas.microsoft.com/office/drawing/2014/main" id="{6740D746-4A8D-C247-BFC8-427B66B6126A}"/>
+                <a16:creationId xmlns:a16="http://schemas.microsoft.com/office/drawing/2014/main" xmlns="" id="{6740D746-4A8D-C247-BFC8-427B66B6126A}"/>
               </a:ext>
             </a:extLst>
           </p:cNvPr>
@@ -9751,7 +9941,7 @@
           <p:cNvPr id="2" name="Title 1">
             <a:extLst>
               <a:ext uri="{FF2B5EF4-FFF2-40B4-BE49-F238E27FC236}">
-                <a16:creationId xmlns="" xmlns:a16="http://schemas.microsoft.com/office/drawing/2014/main" id="{982BC3A4-28FC-CE40-9B85-1AC384A122B3}"/>
+                <a16:creationId xmlns:a16="http://schemas.microsoft.com/office/drawing/2014/main" xmlns="" id="{982BC3A4-28FC-CE40-9B85-1AC384A122B3}"/>
               </a:ext>
             </a:extLst>
           </p:cNvPr>
@@ -9779,7 +9969,7 @@
           <p:cNvPr id="4" name="Oval 3">
             <a:extLst>
               <a:ext uri="{FF2B5EF4-FFF2-40B4-BE49-F238E27FC236}">
-                <a16:creationId xmlns="" xmlns:a16="http://schemas.microsoft.com/office/drawing/2014/main" id="{98E12714-002A-8F45-B772-89E1E4B6AFAD}"/>
+                <a16:creationId xmlns:a16="http://schemas.microsoft.com/office/drawing/2014/main" xmlns="" id="{98E12714-002A-8F45-B772-89E1E4B6AFAD}"/>
               </a:ext>
             </a:extLst>
           </p:cNvPr>
@@ -9829,7 +10019,7 @@
           <p:cNvPr id="5" name="Rectangle: Rounded Corners 4">
             <a:extLst>
               <a:ext uri="{FF2B5EF4-FFF2-40B4-BE49-F238E27FC236}">
-                <a16:creationId xmlns="" xmlns:a16="http://schemas.microsoft.com/office/drawing/2014/main" id="{C984AE45-7F4B-3E4E-A4AB-324EA04B080A}"/>
+                <a16:creationId xmlns:a16="http://schemas.microsoft.com/office/drawing/2014/main" xmlns="" id="{C984AE45-7F4B-3E4E-A4AB-324EA04B080A}"/>
               </a:ext>
             </a:extLst>
           </p:cNvPr>
@@ -9881,7 +10071,7 @@
           <p:cNvPr id="6" name="TextBox 5">
             <a:extLst>
               <a:ext uri="{FF2B5EF4-FFF2-40B4-BE49-F238E27FC236}">
-                <a16:creationId xmlns="" xmlns:a16="http://schemas.microsoft.com/office/drawing/2014/main" id="{D0E690B5-65C2-1A4D-84B7-B0BBEA911F8E}"/>
+                <a16:creationId xmlns:a16="http://schemas.microsoft.com/office/drawing/2014/main" xmlns="" id="{D0E690B5-65C2-1A4D-84B7-B0BBEA911F8E}"/>
               </a:ext>
             </a:extLst>
           </p:cNvPr>
@@ -9935,7 +10125,7 @@
           <p:cNvPr id="7" name="Straight Arrow Connector 6">
             <a:extLst>
               <a:ext uri="{FF2B5EF4-FFF2-40B4-BE49-F238E27FC236}">
-                <a16:creationId xmlns="" xmlns:a16="http://schemas.microsoft.com/office/drawing/2014/main" id="{45AAEBCF-749E-FB43-8CB1-EAEA4AE8EF88}"/>
+                <a16:creationId xmlns:a16="http://schemas.microsoft.com/office/drawing/2014/main" xmlns="" id="{45AAEBCF-749E-FB43-8CB1-EAEA4AE8EF88}"/>
               </a:ext>
             </a:extLst>
           </p:cNvPr>
@@ -9978,7 +10168,7 @@
           <p:cNvPr id="20" name="TextBox 19">
             <a:extLst>
               <a:ext uri="{FF2B5EF4-FFF2-40B4-BE49-F238E27FC236}">
-                <a16:creationId xmlns="" xmlns:a16="http://schemas.microsoft.com/office/drawing/2014/main" id="{1959D82E-0456-144D-B2D3-6EA944A9C4EA}"/>
+                <a16:creationId xmlns:a16="http://schemas.microsoft.com/office/drawing/2014/main" xmlns="" id="{1959D82E-0456-144D-B2D3-6EA944A9C4EA}"/>
               </a:ext>
             </a:extLst>
           </p:cNvPr>
@@ -10019,7 +10209,7 @@
           <p:cNvPr id="3" name="Rectangle: Rounded Corners 2">
             <a:extLst>
               <a:ext uri="{FF2B5EF4-FFF2-40B4-BE49-F238E27FC236}">
-                <a16:creationId xmlns="" xmlns:a16="http://schemas.microsoft.com/office/drawing/2014/main" id="{F43E48B1-B1C1-FA45-AE69-A78BD07EA765}"/>
+                <a16:creationId xmlns:a16="http://schemas.microsoft.com/office/drawing/2014/main" xmlns="" id="{F43E48B1-B1C1-FA45-AE69-A78BD07EA765}"/>
               </a:ext>
             </a:extLst>
           </p:cNvPr>
@@ -10072,7 +10262,7 @@
           <p:cNvPr id="8" name="Rectangle: Rounded Corners 7">
             <a:extLst>
               <a:ext uri="{FF2B5EF4-FFF2-40B4-BE49-F238E27FC236}">
-                <a16:creationId xmlns="" xmlns:a16="http://schemas.microsoft.com/office/drawing/2014/main" id="{21B78B04-1092-CF42-80A7-21846DB82B0C}"/>
+                <a16:creationId xmlns:a16="http://schemas.microsoft.com/office/drawing/2014/main" xmlns="" id="{21B78B04-1092-CF42-80A7-21846DB82B0C}"/>
               </a:ext>
             </a:extLst>
           </p:cNvPr>
@@ -10125,7 +10315,7 @@
           <p:cNvPr id="10" name="Rectangle: Rounded Corners 9">
             <a:extLst>
               <a:ext uri="{FF2B5EF4-FFF2-40B4-BE49-F238E27FC236}">
-                <a16:creationId xmlns="" xmlns:a16="http://schemas.microsoft.com/office/drawing/2014/main" id="{1AFE2ACF-FA76-624A-9515-B6DE4BD43A03}"/>
+                <a16:creationId xmlns:a16="http://schemas.microsoft.com/office/drawing/2014/main" xmlns="" id="{1AFE2ACF-FA76-624A-9515-B6DE4BD43A03}"/>
               </a:ext>
             </a:extLst>
           </p:cNvPr>
@@ -10178,7 +10368,7 @@
           <p:cNvPr id="13" name="TextBox 12">
             <a:extLst>
               <a:ext uri="{FF2B5EF4-FFF2-40B4-BE49-F238E27FC236}">
-                <a16:creationId xmlns="" xmlns:a16="http://schemas.microsoft.com/office/drawing/2014/main" id="{6E8DC8CA-6C40-B54D-A397-C376073EB55B}"/>
+                <a16:creationId xmlns:a16="http://schemas.microsoft.com/office/drawing/2014/main" xmlns="" id="{6E8DC8CA-6C40-B54D-A397-C376073EB55B}"/>
               </a:ext>
             </a:extLst>
           </p:cNvPr>
@@ -10215,7 +10405,7 @@
           <p:cNvPr id="17" name="Straight Arrow Connector 16">
             <a:extLst>
               <a:ext uri="{FF2B5EF4-FFF2-40B4-BE49-F238E27FC236}">
-                <a16:creationId xmlns="" xmlns:a16="http://schemas.microsoft.com/office/drawing/2014/main" id="{43EF946B-702D-7D42-9345-B8E6E59407C7}"/>
+                <a16:creationId xmlns:a16="http://schemas.microsoft.com/office/drawing/2014/main" xmlns="" id="{43EF946B-702D-7D42-9345-B8E6E59407C7}"/>
               </a:ext>
             </a:extLst>
           </p:cNvPr>
@@ -10258,7 +10448,7 @@
           <p:cNvPr id="32" name="Straight Arrow Connector 31">
             <a:extLst>
               <a:ext uri="{FF2B5EF4-FFF2-40B4-BE49-F238E27FC236}">
-                <a16:creationId xmlns="" xmlns:a16="http://schemas.microsoft.com/office/drawing/2014/main" id="{EF4860F9-7D27-A542-A37E-F77796CAAC23}"/>
+                <a16:creationId xmlns:a16="http://schemas.microsoft.com/office/drawing/2014/main" xmlns="" id="{EF4860F9-7D27-A542-A37E-F77796CAAC23}"/>
               </a:ext>
             </a:extLst>
           </p:cNvPr>
@@ -10301,7 +10491,7 @@
           <p:cNvPr id="38" name="Straight Arrow Connector 37">
             <a:extLst>
               <a:ext uri="{FF2B5EF4-FFF2-40B4-BE49-F238E27FC236}">
-                <a16:creationId xmlns="" xmlns:a16="http://schemas.microsoft.com/office/drawing/2014/main" id="{618A4F59-D514-A342-83E8-E31334D078F8}"/>
+                <a16:creationId xmlns:a16="http://schemas.microsoft.com/office/drawing/2014/main" xmlns="" id="{618A4F59-D514-A342-83E8-E31334D078F8}"/>
               </a:ext>
             </a:extLst>
           </p:cNvPr>
@@ -10344,7 +10534,7 @@
           <p:cNvPr id="68" name="Oval 67">
             <a:extLst>
               <a:ext uri="{FF2B5EF4-FFF2-40B4-BE49-F238E27FC236}">
-                <a16:creationId xmlns="" xmlns:a16="http://schemas.microsoft.com/office/drawing/2014/main" id="{4B1ACD04-9615-B147-8D50-5866372EAEA5}"/>
+                <a16:creationId xmlns:a16="http://schemas.microsoft.com/office/drawing/2014/main" xmlns="" id="{4B1ACD04-9615-B147-8D50-5866372EAEA5}"/>
               </a:ext>
             </a:extLst>
           </p:cNvPr>
@@ -10393,7 +10583,7 @@
           <p:cNvPr id="70" name="Oval 69">
             <a:extLst>
               <a:ext uri="{FF2B5EF4-FFF2-40B4-BE49-F238E27FC236}">
-                <a16:creationId xmlns="" xmlns:a16="http://schemas.microsoft.com/office/drawing/2014/main" id="{479A5C67-41DB-2A49-849D-E8F07512740D}"/>
+                <a16:creationId xmlns:a16="http://schemas.microsoft.com/office/drawing/2014/main" xmlns="" id="{479A5C67-41DB-2A49-849D-E8F07512740D}"/>
               </a:ext>
             </a:extLst>
           </p:cNvPr>
@@ -10442,7 +10632,7 @@
           <p:cNvPr id="72" name="Oval 71">
             <a:extLst>
               <a:ext uri="{FF2B5EF4-FFF2-40B4-BE49-F238E27FC236}">
-                <a16:creationId xmlns="" xmlns:a16="http://schemas.microsoft.com/office/drawing/2014/main" id="{2672164B-4C01-6D44-B5E7-F0293F56E78E}"/>
+                <a16:creationId xmlns:a16="http://schemas.microsoft.com/office/drawing/2014/main" xmlns="" id="{2672164B-4C01-6D44-B5E7-F0293F56E78E}"/>
               </a:ext>
             </a:extLst>
           </p:cNvPr>
@@ -10492,7 +10682,7 @@
           <p:cNvPr id="79" name="Straight Arrow Connector 78">
             <a:extLst>
               <a:ext uri="{FF2B5EF4-FFF2-40B4-BE49-F238E27FC236}">
-                <a16:creationId xmlns="" xmlns:a16="http://schemas.microsoft.com/office/drawing/2014/main" id="{C26993FA-3054-3244-8ACC-4EB79E2C6E38}"/>
+                <a16:creationId xmlns:a16="http://schemas.microsoft.com/office/drawing/2014/main" xmlns="" id="{C26993FA-3054-3244-8ACC-4EB79E2C6E38}"/>
               </a:ext>
             </a:extLst>
           </p:cNvPr>
@@ -10535,7 +10725,7 @@
           <p:cNvPr id="87" name="Straight Arrow Connector 86">
             <a:extLst>
               <a:ext uri="{FF2B5EF4-FFF2-40B4-BE49-F238E27FC236}">
-                <a16:creationId xmlns="" xmlns:a16="http://schemas.microsoft.com/office/drawing/2014/main" id="{880F0F40-144F-B542-9AA7-BE4B29F4CC42}"/>
+                <a16:creationId xmlns:a16="http://schemas.microsoft.com/office/drawing/2014/main" xmlns="" id="{880F0F40-144F-B542-9AA7-BE4B29F4CC42}"/>
               </a:ext>
             </a:extLst>
           </p:cNvPr>
@@ -10578,7 +10768,7 @@
           <p:cNvPr id="92" name="Straight Arrow Connector 91">
             <a:extLst>
               <a:ext uri="{FF2B5EF4-FFF2-40B4-BE49-F238E27FC236}">
-                <a16:creationId xmlns="" xmlns:a16="http://schemas.microsoft.com/office/drawing/2014/main" id="{E17C5110-CA13-F741-AD04-1C732E1FE1CA}"/>
+                <a16:creationId xmlns:a16="http://schemas.microsoft.com/office/drawing/2014/main" xmlns="" id="{E17C5110-CA13-F741-AD04-1C732E1FE1CA}"/>
               </a:ext>
             </a:extLst>
           </p:cNvPr>
@@ -10644,7 +10834,7 @@
           <p:cNvPr id="49" name="TextBox 48">
             <a:extLst>
               <a:ext uri="{FF2B5EF4-FFF2-40B4-BE49-F238E27FC236}">
-                <a16:creationId xmlns="" xmlns:a16="http://schemas.microsoft.com/office/drawing/2014/main" id="{6E8DC8CA-6C40-B54D-A397-C376073EB55B}"/>
+                <a16:creationId xmlns:a16="http://schemas.microsoft.com/office/drawing/2014/main" xmlns="" id="{6E8DC8CA-6C40-B54D-A397-C376073EB55B}"/>
               </a:ext>
             </a:extLst>
           </p:cNvPr>
@@ -10681,7 +10871,7 @@
           <p:cNvPr id="50" name="TextBox 49">
             <a:extLst>
               <a:ext uri="{FF2B5EF4-FFF2-40B4-BE49-F238E27FC236}">
-                <a16:creationId xmlns="" xmlns:a16="http://schemas.microsoft.com/office/drawing/2014/main" id="{6E8DC8CA-6C40-B54D-A397-C376073EB55B}"/>
+                <a16:creationId xmlns:a16="http://schemas.microsoft.com/office/drawing/2014/main" xmlns="" id="{6E8DC8CA-6C40-B54D-A397-C376073EB55B}"/>
               </a:ext>
             </a:extLst>
           </p:cNvPr>
@@ -10796,7 +10986,7 @@
           <p:cNvPr id="2" name="Title 1">
             <a:extLst>
               <a:ext uri="{FF2B5EF4-FFF2-40B4-BE49-F238E27FC236}">
-                <a16:creationId xmlns="" xmlns:a16="http://schemas.microsoft.com/office/drawing/2014/main" id="{1DA78D53-10E1-3D47-8D9D-2F50C5A7A488}"/>
+                <a16:creationId xmlns:a16="http://schemas.microsoft.com/office/drawing/2014/main" xmlns="" id="{1DA78D53-10E1-3D47-8D9D-2F50C5A7A488}"/>
               </a:ext>
             </a:extLst>
           </p:cNvPr>
@@ -10824,7 +11014,7 @@
           <p:cNvPr id="4" name="Oval 3">
             <a:extLst>
               <a:ext uri="{FF2B5EF4-FFF2-40B4-BE49-F238E27FC236}">
-                <a16:creationId xmlns="" xmlns:a16="http://schemas.microsoft.com/office/drawing/2014/main" id="{33B998C3-52C7-444E-BB5A-FC8C4EC8A96C}"/>
+                <a16:creationId xmlns:a16="http://schemas.microsoft.com/office/drawing/2014/main" xmlns="" id="{33B998C3-52C7-444E-BB5A-FC8C4EC8A96C}"/>
               </a:ext>
             </a:extLst>
           </p:cNvPr>
@@ -10874,7 +11064,7 @@
           <p:cNvPr id="5" name="Straight Arrow Connector 4">
             <a:extLst>
               <a:ext uri="{FF2B5EF4-FFF2-40B4-BE49-F238E27FC236}">
-                <a16:creationId xmlns="" xmlns:a16="http://schemas.microsoft.com/office/drawing/2014/main" id="{26063CBA-F54D-394A-A34F-4115EC0D3847}"/>
+                <a16:creationId xmlns:a16="http://schemas.microsoft.com/office/drawing/2014/main" xmlns="" id="{26063CBA-F54D-394A-A34F-4115EC0D3847}"/>
               </a:ext>
             </a:extLst>
           </p:cNvPr>
@@ -10917,7 +11107,7 @@
           <p:cNvPr id="22" name="Oval 21">
             <a:extLst>
               <a:ext uri="{FF2B5EF4-FFF2-40B4-BE49-F238E27FC236}">
-                <a16:creationId xmlns="" xmlns:a16="http://schemas.microsoft.com/office/drawing/2014/main" id="{787ACDD4-72C7-3A4D-AA5B-3354BABF069D}"/>
+                <a16:creationId xmlns:a16="http://schemas.microsoft.com/office/drawing/2014/main" xmlns="" id="{787ACDD4-72C7-3A4D-AA5B-3354BABF069D}"/>
               </a:ext>
             </a:extLst>
           </p:cNvPr>
@@ -10967,7 +11157,7 @@
           <p:cNvPr id="25" name="Rectangle: Rounded Corners 24">
             <a:extLst>
               <a:ext uri="{FF2B5EF4-FFF2-40B4-BE49-F238E27FC236}">
-                <a16:creationId xmlns="" xmlns:a16="http://schemas.microsoft.com/office/drawing/2014/main" id="{3F704208-5435-C347-A13F-823382A2FCF3}"/>
+                <a16:creationId xmlns:a16="http://schemas.microsoft.com/office/drawing/2014/main" xmlns="" id="{3F704208-5435-C347-A13F-823382A2FCF3}"/>
               </a:ext>
             </a:extLst>
           </p:cNvPr>
@@ -11024,7 +11214,7 @@
           <p:cNvPr id="31" name="Rectangle: Rounded Corners 30">
             <a:extLst>
               <a:ext uri="{FF2B5EF4-FFF2-40B4-BE49-F238E27FC236}">
-                <a16:creationId xmlns="" xmlns:a16="http://schemas.microsoft.com/office/drawing/2014/main" id="{9F04162C-BD17-3146-9F79-689FAAE9C26C}"/>
+                <a16:creationId xmlns:a16="http://schemas.microsoft.com/office/drawing/2014/main" xmlns="" id="{9F04162C-BD17-3146-9F79-689FAAE9C26C}"/>
               </a:ext>
             </a:extLst>
           </p:cNvPr>
@@ -11076,7 +11266,7 @@
           <p:cNvPr id="33" name="Rectangle: Rounded Corners 32">
             <a:extLst>
               <a:ext uri="{FF2B5EF4-FFF2-40B4-BE49-F238E27FC236}">
-                <a16:creationId xmlns="" xmlns:a16="http://schemas.microsoft.com/office/drawing/2014/main" id="{D7D8B533-0307-F049-8D0C-C8BE02F5F079}"/>
+                <a16:creationId xmlns:a16="http://schemas.microsoft.com/office/drawing/2014/main" xmlns="" id="{D7D8B533-0307-F049-8D0C-C8BE02F5F079}"/>
               </a:ext>
             </a:extLst>
           </p:cNvPr>
@@ -11128,7 +11318,7 @@
           <p:cNvPr id="35" name="Rectangle: Rounded Corners 34">
             <a:extLst>
               <a:ext uri="{FF2B5EF4-FFF2-40B4-BE49-F238E27FC236}">
-                <a16:creationId xmlns="" xmlns:a16="http://schemas.microsoft.com/office/drawing/2014/main" id="{40EE904D-821E-474D-9819-E5D34B320140}"/>
+                <a16:creationId xmlns:a16="http://schemas.microsoft.com/office/drawing/2014/main" xmlns="" id="{40EE904D-821E-474D-9819-E5D34B320140}"/>
               </a:ext>
             </a:extLst>
           </p:cNvPr>
@@ -11180,7 +11370,7 @@
           <p:cNvPr id="36" name="Straight Arrow Connector 35">
             <a:extLst>
               <a:ext uri="{FF2B5EF4-FFF2-40B4-BE49-F238E27FC236}">
-                <a16:creationId xmlns="" xmlns:a16="http://schemas.microsoft.com/office/drawing/2014/main" id="{F8AAA69A-E8D9-1B4E-996F-34029F7F7E44}"/>
+                <a16:creationId xmlns:a16="http://schemas.microsoft.com/office/drawing/2014/main" xmlns="" id="{F8AAA69A-E8D9-1B4E-996F-34029F7F7E44}"/>
               </a:ext>
             </a:extLst>
           </p:cNvPr>
@@ -11223,7 +11413,7 @@
           <p:cNvPr id="46" name="Straight Arrow Connector 45">
             <a:extLst>
               <a:ext uri="{FF2B5EF4-FFF2-40B4-BE49-F238E27FC236}">
-                <a16:creationId xmlns="" xmlns:a16="http://schemas.microsoft.com/office/drawing/2014/main" id="{6E84F913-E9AC-3A45-B5C8-2D61DB082359}"/>
+                <a16:creationId xmlns:a16="http://schemas.microsoft.com/office/drawing/2014/main" xmlns="" id="{6E84F913-E9AC-3A45-B5C8-2D61DB082359}"/>
               </a:ext>
             </a:extLst>
           </p:cNvPr>
@@ -11266,7 +11456,7 @@
           <p:cNvPr id="54" name="Straight Arrow Connector 53">
             <a:extLst>
               <a:ext uri="{FF2B5EF4-FFF2-40B4-BE49-F238E27FC236}">
-                <a16:creationId xmlns="" xmlns:a16="http://schemas.microsoft.com/office/drawing/2014/main" id="{FA5D730D-1095-5C46-9B9F-63A0C8FF4EC4}"/>
+                <a16:creationId xmlns:a16="http://schemas.microsoft.com/office/drawing/2014/main" xmlns="" id="{FA5D730D-1095-5C46-9B9F-63A0C8FF4EC4}"/>
               </a:ext>
             </a:extLst>
           </p:cNvPr>
@@ -11309,7 +11499,7 @@
           <p:cNvPr id="68" name="Straight Arrow Connector 67">
             <a:extLst>
               <a:ext uri="{FF2B5EF4-FFF2-40B4-BE49-F238E27FC236}">
-                <a16:creationId xmlns="" xmlns:a16="http://schemas.microsoft.com/office/drawing/2014/main" id="{CD23FC08-D44C-1247-8148-0233A8134F8B}"/>
+                <a16:creationId xmlns:a16="http://schemas.microsoft.com/office/drawing/2014/main" xmlns="" id="{CD23FC08-D44C-1247-8148-0233A8134F8B}"/>
               </a:ext>
             </a:extLst>
           </p:cNvPr>
@@ -11351,7 +11541,7 @@
           <p:cNvPr id="3" name="Straight Arrow Connector 2">
             <a:extLst>
               <a:ext uri="{FF2B5EF4-FFF2-40B4-BE49-F238E27FC236}">
-                <a16:creationId xmlns="" xmlns:a16="http://schemas.microsoft.com/office/drawing/2014/main" id="{BFC43AB4-1F6A-C64C-9E4B-092E474C78D3}"/>
+                <a16:creationId xmlns:a16="http://schemas.microsoft.com/office/drawing/2014/main" xmlns="" id="{BFC43AB4-1F6A-C64C-9E4B-092E474C78D3}"/>
               </a:ext>
             </a:extLst>
           </p:cNvPr>
@@ -11393,7 +11583,7 @@
           <p:cNvPr id="8" name="Straight Arrow Connector 7">
             <a:extLst>
               <a:ext uri="{FF2B5EF4-FFF2-40B4-BE49-F238E27FC236}">
-                <a16:creationId xmlns="" xmlns:a16="http://schemas.microsoft.com/office/drawing/2014/main" id="{40981754-DC72-6D40-A1E0-9DCF49D13C78}"/>
+                <a16:creationId xmlns:a16="http://schemas.microsoft.com/office/drawing/2014/main" xmlns="" id="{40981754-DC72-6D40-A1E0-9DCF49D13C78}"/>
               </a:ext>
             </a:extLst>
           </p:cNvPr>
@@ -11459,7 +11649,7 @@
           <p:cNvPr id="27" name="Oval 26">
             <a:extLst>
               <a:ext uri="{FF2B5EF4-FFF2-40B4-BE49-F238E27FC236}">
-                <a16:creationId xmlns="" xmlns:a16="http://schemas.microsoft.com/office/drawing/2014/main" id="{787ACDD4-72C7-3A4D-AA5B-3354BABF069D}"/>
+                <a16:creationId xmlns:a16="http://schemas.microsoft.com/office/drawing/2014/main" xmlns="" id="{787ACDD4-72C7-3A4D-AA5B-3354BABF069D}"/>
               </a:ext>
             </a:extLst>
           </p:cNvPr>
@@ -11509,7 +11699,7 @@
           <p:cNvPr id="28" name="Oval 27">
             <a:extLst>
               <a:ext uri="{FF2B5EF4-FFF2-40B4-BE49-F238E27FC236}">
-                <a16:creationId xmlns="" xmlns:a16="http://schemas.microsoft.com/office/drawing/2014/main" id="{787ACDD4-72C7-3A4D-AA5B-3354BABF069D}"/>
+                <a16:creationId xmlns:a16="http://schemas.microsoft.com/office/drawing/2014/main" xmlns="" id="{787ACDD4-72C7-3A4D-AA5B-3354BABF069D}"/>
               </a:ext>
             </a:extLst>
           </p:cNvPr>
@@ -11608,7 +11798,7 @@
           <p:cNvPr id="2" name="Title 1">
             <a:extLst>
               <a:ext uri="{FF2B5EF4-FFF2-40B4-BE49-F238E27FC236}">
-                <a16:creationId xmlns="" xmlns:a16="http://schemas.microsoft.com/office/drawing/2014/main" id="{63695BC3-BEC1-504D-90B9-FB04F79787AF}"/>
+                <a16:creationId xmlns:a16="http://schemas.microsoft.com/office/drawing/2014/main" xmlns="" id="{63695BC3-BEC1-504D-90B9-FB04F79787AF}"/>
               </a:ext>
             </a:extLst>
           </p:cNvPr>
@@ -11636,7 +11826,7 @@
           <p:cNvPr id="4" name="TextBox 3">
             <a:extLst>
               <a:ext uri="{FF2B5EF4-FFF2-40B4-BE49-F238E27FC236}">
-                <a16:creationId xmlns="" xmlns:a16="http://schemas.microsoft.com/office/drawing/2014/main" id="{303C0764-6E74-034B-9647-8FDBC08D2676}"/>
+                <a16:creationId xmlns:a16="http://schemas.microsoft.com/office/drawing/2014/main" xmlns="" id="{303C0764-6E74-034B-9647-8FDBC08D2676}"/>
               </a:ext>
             </a:extLst>
           </p:cNvPr>
@@ -11676,7 +11866,7 @@
           <p:cNvPr id="5" name="TextBox 4">
             <a:extLst>
               <a:ext uri="{FF2B5EF4-FFF2-40B4-BE49-F238E27FC236}">
-                <a16:creationId xmlns="" xmlns:a16="http://schemas.microsoft.com/office/drawing/2014/main" id="{FEDC0C03-AB5E-DC48-B38D-BFDF7B1A6661}"/>
+                <a16:creationId xmlns:a16="http://schemas.microsoft.com/office/drawing/2014/main" xmlns="" id="{FEDC0C03-AB5E-DC48-B38D-BFDF7B1A6661}"/>
               </a:ext>
             </a:extLst>
           </p:cNvPr>
@@ -11719,7 +11909,7 @@
           <p:cNvPr id="7" name="TextBox 6">
             <a:extLst>
               <a:ext uri="{FF2B5EF4-FFF2-40B4-BE49-F238E27FC236}">
-                <a16:creationId xmlns="" xmlns:a16="http://schemas.microsoft.com/office/drawing/2014/main" id="{E3C92A7E-C3E1-1E47-866C-10D054289EAA}"/>
+                <a16:creationId xmlns:a16="http://schemas.microsoft.com/office/drawing/2014/main" xmlns="" id="{E3C92A7E-C3E1-1E47-866C-10D054289EAA}"/>
               </a:ext>
             </a:extLst>
           </p:cNvPr>
@@ -11777,7 +11967,7 @@
           <p:cNvPr id="8" name="Oval 7">
             <a:extLst>
               <a:ext uri="{FF2B5EF4-FFF2-40B4-BE49-F238E27FC236}">
-                <a16:creationId xmlns="" xmlns:a16="http://schemas.microsoft.com/office/drawing/2014/main" id="{98E12714-002A-8F45-B772-89E1E4B6AFAD}"/>
+                <a16:creationId xmlns:a16="http://schemas.microsoft.com/office/drawing/2014/main" xmlns="" id="{98E12714-002A-8F45-B772-89E1E4B6AFAD}"/>
               </a:ext>
             </a:extLst>
           </p:cNvPr>
@@ -11827,7 +12017,7 @@
           <p:cNvPr id="9" name="Rectangle: Rounded Corners 4">
             <a:extLst>
               <a:ext uri="{FF2B5EF4-FFF2-40B4-BE49-F238E27FC236}">
-                <a16:creationId xmlns="" xmlns:a16="http://schemas.microsoft.com/office/drawing/2014/main" id="{C984AE45-7F4B-3E4E-A4AB-324EA04B080A}"/>
+                <a16:creationId xmlns:a16="http://schemas.microsoft.com/office/drawing/2014/main" xmlns="" id="{C984AE45-7F4B-3E4E-A4AB-324EA04B080A}"/>
               </a:ext>
             </a:extLst>
           </p:cNvPr>
@@ -11880,7 +12070,7 @@
           <p:cNvPr id="11" name="Straight Arrow Connector 10">
             <a:extLst>
               <a:ext uri="{FF2B5EF4-FFF2-40B4-BE49-F238E27FC236}">
-                <a16:creationId xmlns="" xmlns:a16="http://schemas.microsoft.com/office/drawing/2014/main" id="{45AAEBCF-749E-FB43-8CB1-EAEA4AE8EF88}"/>
+                <a16:creationId xmlns:a16="http://schemas.microsoft.com/office/drawing/2014/main" xmlns="" id="{45AAEBCF-749E-FB43-8CB1-EAEA4AE8EF88}"/>
               </a:ext>
             </a:extLst>
           </p:cNvPr>
@@ -11923,7 +12113,7 @@
           <p:cNvPr id="13" name="Rectangle: Rounded Corners 2">
             <a:extLst>
               <a:ext uri="{FF2B5EF4-FFF2-40B4-BE49-F238E27FC236}">
-                <a16:creationId xmlns="" xmlns:a16="http://schemas.microsoft.com/office/drawing/2014/main" id="{F43E48B1-B1C1-FA45-AE69-A78BD07EA765}"/>
+                <a16:creationId xmlns:a16="http://schemas.microsoft.com/office/drawing/2014/main" xmlns="" id="{F43E48B1-B1C1-FA45-AE69-A78BD07EA765}"/>
               </a:ext>
             </a:extLst>
           </p:cNvPr>
@@ -11976,7 +12166,7 @@
           <p:cNvPr id="14" name="Rectangle: Rounded Corners 7">
             <a:extLst>
               <a:ext uri="{FF2B5EF4-FFF2-40B4-BE49-F238E27FC236}">
-                <a16:creationId xmlns="" xmlns:a16="http://schemas.microsoft.com/office/drawing/2014/main" id="{21B78B04-1092-CF42-80A7-21846DB82B0C}"/>
+                <a16:creationId xmlns:a16="http://schemas.microsoft.com/office/drawing/2014/main" xmlns="" id="{21B78B04-1092-CF42-80A7-21846DB82B0C}"/>
               </a:ext>
             </a:extLst>
           </p:cNvPr>
@@ -12029,7 +12219,7 @@
           <p:cNvPr id="15" name="Rectangle: Rounded Corners 9">
             <a:extLst>
               <a:ext uri="{FF2B5EF4-FFF2-40B4-BE49-F238E27FC236}">
-                <a16:creationId xmlns="" xmlns:a16="http://schemas.microsoft.com/office/drawing/2014/main" id="{1AFE2ACF-FA76-624A-9515-B6DE4BD43A03}"/>
+                <a16:creationId xmlns:a16="http://schemas.microsoft.com/office/drawing/2014/main" xmlns="" id="{1AFE2ACF-FA76-624A-9515-B6DE4BD43A03}"/>
               </a:ext>
             </a:extLst>
           </p:cNvPr>
@@ -12082,7 +12272,7 @@
           <p:cNvPr id="16" name="TextBox 15">
             <a:extLst>
               <a:ext uri="{FF2B5EF4-FFF2-40B4-BE49-F238E27FC236}">
-                <a16:creationId xmlns="" xmlns:a16="http://schemas.microsoft.com/office/drawing/2014/main" id="{6E8DC8CA-6C40-B54D-A397-C376073EB55B}"/>
+                <a16:creationId xmlns:a16="http://schemas.microsoft.com/office/drawing/2014/main" xmlns="" id="{6E8DC8CA-6C40-B54D-A397-C376073EB55B}"/>
               </a:ext>
             </a:extLst>
           </p:cNvPr>
@@ -12127,7 +12317,7 @@
           <p:cNvPr id="17" name="Straight Arrow Connector 16">
             <a:extLst>
               <a:ext uri="{FF2B5EF4-FFF2-40B4-BE49-F238E27FC236}">
-                <a16:creationId xmlns="" xmlns:a16="http://schemas.microsoft.com/office/drawing/2014/main" id="{43EF946B-702D-7D42-9345-B8E6E59407C7}"/>
+                <a16:creationId xmlns:a16="http://schemas.microsoft.com/office/drawing/2014/main" xmlns="" id="{43EF946B-702D-7D42-9345-B8E6E59407C7}"/>
               </a:ext>
             </a:extLst>
           </p:cNvPr>
@@ -12170,7 +12360,7 @@
           <p:cNvPr id="18" name="Straight Arrow Connector 17">
             <a:extLst>
               <a:ext uri="{FF2B5EF4-FFF2-40B4-BE49-F238E27FC236}">
-                <a16:creationId xmlns="" xmlns:a16="http://schemas.microsoft.com/office/drawing/2014/main" id="{EF4860F9-7D27-A542-A37E-F77796CAAC23}"/>
+                <a16:creationId xmlns:a16="http://schemas.microsoft.com/office/drawing/2014/main" xmlns="" id="{EF4860F9-7D27-A542-A37E-F77796CAAC23}"/>
               </a:ext>
             </a:extLst>
           </p:cNvPr>
@@ -12213,7 +12403,7 @@
           <p:cNvPr id="19" name="Straight Arrow Connector 18">
             <a:extLst>
               <a:ext uri="{FF2B5EF4-FFF2-40B4-BE49-F238E27FC236}">
-                <a16:creationId xmlns="" xmlns:a16="http://schemas.microsoft.com/office/drawing/2014/main" id="{618A4F59-D514-A342-83E8-E31334D078F8}"/>
+                <a16:creationId xmlns:a16="http://schemas.microsoft.com/office/drawing/2014/main" xmlns="" id="{618A4F59-D514-A342-83E8-E31334D078F8}"/>
               </a:ext>
             </a:extLst>
           </p:cNvPr>
@@ -12256,7 +12446,7 @@
           <p:cNvPr id="20" name="Oval 19">
             <a:extLst>
               <a:ext uri="{FF2B5EF4-FFF2-40B4-BE49-F238E27FC236}">
-                <a16:creationId xmlns="" xmlns:a16="http://schemas.microsoft.com/office/drawing/2014/main" id="{4B1ACD04-9615-B147-8D50-5866372EAEA5}"/>
+                <a16:creationId xmlns:a16="http://schemas.microsoft.com/office/drawing/2014/main" xmlns="" id="{4B1ACD04-9615-B147-8D50-5866372EAEA5}"/>
               </a:ext>
             </a:extLst>
           </p:cNvPr>
@@ -12305,7 +12495,7 @@
           <p:cNvPr id="21" name="Oval 20">
             <a:extLst>
               <a:ext uri="{FF2B5EF4-FFF2-40B4-BE49-F238E27FC236}">
-                <a16:creationId xmlns="" xmlns:a16="http://schemas.microsoft.com/office/drawing/2014/main" id="{479A5C67-41DB-2A49-849D-E8F07512740D}"/>
+                <a16:creationId xmlns:a16="http://schemas.microsoft.com/office/drawing/2014/main" xmlns="" id="{479A5C67-41DB-2A49-849D-E8F07512740D}"/>
               </a:ext>
             </a:extLst>
           </p:cNvPr>
@@ -12355,7 +12545,7 @@
           <p:cNvPr id="22" name="Oval 21">
             <a:extLst>
               <a:ext uri="{FF2B5EF4-FFF2-40B4-BE49-F238E27FC236}">
-                <a16:creationId xmlns="" xmlns:a16="http://schemas.microsoft.com/office/drawing/2014/main" id="{2672164B-4C01-6D44-B5E7-F0293F56E78E}"/>
+                <a16:creationId xmlns:a16="http://schemas.microsoft.com/office/drawing/2014/main" xmlns="" id="{2672164B-4C01-6D44-B5E7-F0293F56E78E}"/>
               </a:ext>
             </a:extLst>
           </p:cNvPr>
@@ -12405,7 +12595,7 @@
           <p:cNvPr id="23" name="Straight Arrow Connector 22">
             <a:extLst>
               <a:ext uri="{FF2B5EF4-FFF2-40B4-BE49-F238E27FC236}">
-                <a16:creationId xmlns="" xmlns:a16="http://schemas.microsoft.com/office/drawing/2014/main" id="{C26993FA-3054-3244-8ACC-4EB79E2C6E38}"/>
+                <a16:creationId xmlns:a16="http://schemas.microsoft.com/office/drawing/2014/main" xmlns="" id="{C26993FA-3054-3244-8ACC-4EB79E2C6E38}"/>
               </a:ext>
             </a:extLst>
           </p:cNvPr>
@@ -12448,7 +12638,7 @@
           <p:cNvPr id="24" name="Straight Arrow Connector 23">
             <a:extLst>
               <a:ext uri="{FF2B5EF4-FFF2-40B4-BE49-F238E27FC236}">
-                <a16:creationId xmlns="" xmlns:a16="http://schemas.microsoft.com/office/drawing/2014/main" id="{880F0F40-144F-B542-9AA7-BE4B29F4CC42}"/>
+                <a16:creationId xmlns:a16="http://schemas.microsoft.com/office/drawing/2014/main" xmlns="" id="{880F0F40-144F-B542-9AA7-BE4B29F4CC42}"/>
               </a:ext>
             </a:extLst>
           </p:cNvPr>
@@ -12491,7 +12681,7 @@
           <p:cNvPr id="25" name="Straight Arrow Connector 24">
             <a:extLst>
               <a:ext uri="{FF2B5EF4-FFF2-40B4-BE49-F238E27FC236}">
-                <a16:creationId xmlns="" xmlns:a16="http://schemas.microsoft.com/office/drawing/2014/main" id="{E17C5110-CA13-F741-AD04-1C732E1FE1CA}"/>
+                <a16:creationId xmlns:a16="http://schemas.microsoft.com/office/drawing/2014/main" xmlns="" id="{E17C5110-CA13-F741-AD04-1C732E1FE1CA}"/>
               </a:ext>
             </a:extLst>
           </p:cNvPr>
@@ -12534,7 +12724,7 @@
           <p:cNvPr id="26" name="TextBox 25">
             <a:extLst>
               <a:ext uri="{FF2B5EF4-FFF2-40B4-BE49-F238E27FC236}">
-                <a16:creationId xmlns="" xmlns:a16="http://schemas.microsoft.com/office/drawing/2014/main" id="{6E8DC8CA-6C40-B54D-A397-C376073EB55B}"/>
+                <a16:creationId xmlns:a16="http://schemas.microsoft.com/office/drawing/2014/main" xmlns="" id="{6E8DC8CA-6C40-B54D-A397-C376073EB55B}"/>
               </a:ext>
             </a:extLst>
           </p:cNvPr>
@@ -12575,7 +12765,7 @@
           <p:cNvPr id="27" name="TextBox 26">
             <a:extLst>
               <a:ext uri="{FF2B5EF4-FFF2-40B4-BE49-F238E27FC236}">
-                <a16:creationId xmlns="" xmlns:a16="http://schemas.microsoft.com/office/drawing/2014/main" id="{6E8DC8CA-6C40-B54D-A397-C376073EB55B}"/>
+                <a16:creationId xmlns:a16="http://schemas.microsoft.com/office/drawing/2014/main" xmlns="" id="{6E8DC8CA-6C40-B54D-A397-C376073EB55B}"/>
               </a:ext>
             </a:extLst>
           </p:cNvPr>
@@ -12741,7 +12931,7 @@
           <p:cNvPr id="5" name="Oval 4">
             <a:extLst>
               <a:ext uri="{FF2B5EF4-FFF2-40B4-BE49-F238E27FC236}">
-                <a16:creationId xmlns="" xmlns:a16="http://schemas.microsoft.com/office/drawing/2014/main" id="{98E12714-002A-8F45-B772-89E1E4B6AFAD}"/>
+                <a16:creationId xmlns:a16="http://schemas.microsoft.com/office/drawing/2014/main" xmlns="" id="{98E12714-002A-8F45-B772-89E1E4B6AFAD}"/>
               </a:ext>
             </a:extLst>
           </p:cNvPr>
@@ -12791,7 +12981,7 @@
           <p:cNvPr id="6" name="Rectangle: Rounded Corners 4">
             <a:extLst>
               <a:ext uri="{FF2B5EF4-FFF2-40B4-BE49-F238E27FC236}">
-                <a16:creationId xmlns="" xmlns:a16="http://schemas.microsoft.com/office/drawing/2014/main" id="{C984AE45-7F4B-3E4E-A4AB-324EA04B080A}"/>
+                <a16:creationId xmlns:a16="http://schemas.microsoft.com/office/drawing/2014/main" xmlns="" id="{C984AE45-7F4B-3E4E-A4AB-324EA04B080A}"/>
               </a:ext>
             </a:extLst>
           </p:cNvPr>
@@ -12843,7 +13033,7 @@
           <p:cNvPr id="7" name="Straight Arrow Connector 6">
             <a:extLst>
               <a:ext uri="{FF2B5EF4-FFF2-40B4-BE49-F238E27FC236}">
-                <a16:creationId xmlns="" xmlns:a16="http://schemas.microsoft.com/office/drawing/2014/main" id="{45AAEBCF-749E-FB43-8CB1-EAEA4AE8EF88}"/>
+                <a16:creationId xmlns:a16="http://schemas.microsoft.com/office/drawing/2014/main" xmlns="" id="{45AAEBCF-749E-FB43-8CB1-EAEA4AE8EF88}"/>
               </a:ext>
             </a:extLst>
           </p:cNvPr>
@@ -12886,7 +13076,7 @@
           <p:cNvPr id="9" name="Rectangle: Rounded Corners 9">
             <a:extLst>
               <a:ext uri="{FF2B5EF4-FFF2-40B4-BE49-F238E27FC236}">
-                <a16:creationId xmlns="" xmlns:a16="http://schemas.microsoft.com/office/drawing/2014/main" id="{1AFE2ACF-FA76-624A-9515-B6DE4BD43A03}"/>
+                <a16:creationId xmlns:a16="http://schemas.microsoft.com/office/drawing/2014/main" xmlns="" id="{1AFE2ACF-FA76-624A-9515-B6DE4BD43A03}"/>
               </a:ext>
             </a:extLst>
           </p:cNvPr>
@@ -12939,7 +13129,7 @@
           <p:cNvPr id="11" name="Straight Arrow Connector 10">
             <a:extLst>
               <a:ext uri="{FF2B5EF4-FFF2-40B4-BE49-F238E27FC236}">
-                <a16:creationId xmlns="" xmlns:a16="http://schemas.microsoft.com/office/drawing/2014/main" id="{EF4860F9-7D27-A542-A37E-F77796CAAC23}"/>
+                <a16:creationId xmlns:a16="http://schemas.microsoft.com/office/drawing/2014/main" xmlns="" id="{EF4860F9-7D27-A542-A37E-F77796CAAC23}"/>
               </a:ext>
             </a:extLst>
           </p:cNvPr>
@@ -12982,7 +13172,7 @@
           <p:cNvPr id="12" name="Straight Arrow Connector 11">
             <a:extLst>
               <a:ext uri="{FF2B5EF4-FFF2-40B4-BE49-F238E27FC236}">
-                <a16:creationId xmlns="" xmlns:a16="http://schemas.microsoft.com/office/drawing/2014/main" id="{618A4F59-D514-A342-83E8-E31334D078F8}"/>
+                <a16:creationId xmlns:a16="http://schemas.microsoft.com/office/drawing/2014/main" xmlns="" id="{618A4F59-D514-A342-83E8-E31334D078F8}"/>
               </a:ext>
             </a:extLst>
           </p:cNvPr>
@@ -13025,7 +13215,7 @@
           <p:cNvPr id="15" name="Straight Arrow Connector 14">
             <a:extLst>
               <a:ext uri="{FF2B5EF4-FFF2-40B4-BE49-F238E27FC236}">
-                <a16:creationId xmlns="" xmlns:a16="http://schemas.microsoft.com/office/drawing/2014/main" id="{880F0F40-144F-B542-9AA7-BE4B29F4CC42}"/>
+                <a16:creationId xmlns:a16="http://schemas.microsoft.com/office/drawing/2014/main" xmlns="" id="{880F0F40-144F-B542-9AA7-BE4B29F4CC42}"/>
               </a:ext>
             </a:extLst>
           </p:cNvPr>
@@ -13068,7 +13258,7 @@
           <p:cNvPr id="16" name="Straight Arrow Connector 15">
             <a:extLst>
               <a:ext uri="{FF2B5EF4-FFF2-40B4-BE49-F238E27FC236}">
-                <a16:creationId xmlns="" xmlns:a16="http://schemas.microsoft.com/office/drawing/2014/main" id="{E17C5110-CA13-F741-AD04-1C732E1FE1CA}"/>
+                <a16:creationId xmlns:a16="http://schemas.microsoft.com/office/drawing/2014/main" xmlns="" id="{E17C5110-CA13-F741-AD04-1C732E1FE1CA}"/>
               </a:ext>
             </a:extLst>
           </p:cNvPr>
@@ -13111,7 +13301,7 @@
           <p:cNvPr id="17" name="TextBox 16">
             <a:extLst>
               <a:ext uri="{FF2B5EF4-FFF2-40B4-BE49-F238E27FC236}">
-                <a16:creationId xmlns="" xmlns:a16="http://schemas.microsoft.com/office/drawing/2014/main" id="{6E8DC8CA-6C40-B54D-A397-C376073EB55B}"/>
+                <a16:creationId xmlns:a16="http://schemas.microsoft.com/office/drawing/2014/main" xmlns="" id="{6E8DC8CA-6C40-B54D-A397-C376073EB55B}"/>
               </a:ext>
             </a:extLst>
           </p:cNvPr>
@@ -13148,7 +13338,7 @@
           <p:cNvPr id="27" name="TextBox 26">
             <a:extLst>
               <a:ext uri="{FF2B5EF4-FFF2-40B4-BE49-F238E27FC236}">
-                <a16:creationId xmlns="" xmlns:a16="http://schemas.microsoft.com/office/drawing/2014/main" id="{6E8DC8CA-6C40-B54D-A397-C376073EB55B}"/>
+                <a16:creationId xmlns:a16="http://schemas.microsoft.com/office/drawing/2014/main" xmlns="" id="{6E8DC8CA-6C40-B54D-A397-C376073EB55B}"/>
               </a:ext>
             </a:extLst>
           </p:cNvPr>
@@ -13185,7 +13375,7 @@
           <p:cNvPr id="32" name="Straight Arrow Connector 31">
             <a:extLst>
               <a:ext uri="{FF2B5EF4-FFF2-40B4-BE49-F238E27FC236}">
-                <a16:creationId xmlns="" xmlns:a16="http://schemas.microsoft.com/office/drawing/2014/main" id="{EF4860F9-7D27-A542-A37E-F77796CAAC23}"/>
+                <a16:creationId xmlns:a16="http://schemas.microsoft.com/office/drawing/2014/main" xmlns="" id="{EF4860F9-7D27-A542-A37E-F77796CAAC23}"/>
               </a:ext>
             </a:extLst>
           </p:cNvPr>
@@ -13228,7 +13418,7 @@
           <p:cNvPr id="37" name="Oval 36">
             <a:extLst>
               <a:ext uri="{FF2B5EF4-FFF2-40B4-BE49-F238E27FC236}">
-                <a16:creationId xmlns="" xmlns:a16="http://schemas.microsoft.com/office/drawing/2014/main" id="{479A5C67-41DB-2A49-849D-E8F07512740D}"/>
+                <a16:creationId xmlns:a16="http://schemas.microsoft.com/office/drawing/2014/main" xmlns="" id="{479A5C67-41DB-2A49-849D-E8F07512740D}"/>
               </a:ext>
             </a:extLst>
           </p:cNvPr>
@@ -13308,7 +13498,7 @@
           <p:cNvPr id="42" name="Rectangle: Rounded Corners 9">
             <a:extLst>
               <a:ext uri="{FF2B5EF4-FFF2-40B4-BE49-F238E27FC236}">
-                <a16:creationId xmlns="" xmlns:a16="http://schemas.microsoft.com/office/drawing/2014/main" id="{1AFE2ACF-FA76-624A-9515-B6DE4BD43A03}"/>
+                <a16:creationId xmlns:a16="http://schemas.microsoft.com/office/drawing/2014/main" xmlns="" id="{1AFE2ACF-FA76-624A-9515-B6DE4BD43A03}"/>
               </a:ext>
             </a:extLst>
           </p:cNvPr>
@@ -13361,7 +13551,7 @@
           <p:cNvPr id="43" name="Rectangle: Rounded Corners 9">
             <a:extLst>
               <a:ext uri="{FF2B5EF4-FFF2-40B4-BE49-F238E27FC236}">
-                <a16:creationId xmlns="" xmlns:a16="http://schemas.microsoft.com/office/drawing/2014/main" id="{1AFE2ACF-FA76-624A-9515-B6DE4BD43A03}"/>
+                <a16:creationId xmlns:a16="http://schemas.microsoft.com/office/drawing/2014/main" xmlns="" id="{1AFE2ACF-FA76-624A-9515-B6DE4BD43A03}"/>
               </a:ext>
             </a:extLst>
           </p:cNvPr>
@@ -13414,7 +13604,7 @@
           <p:cNvPr id="55" name="Oval 54">
             <a:extLst>
               <a:ext uri="{FF2B5EF4-FFF2-40B4-BE49-F238E27FC236}">
-                <a16:creationId xmlns="" xmlns:a16="http://schemas.microsoft.com/office/drawing/2014/main" id="{479A5C67-41DB-2A49-849D-E8F07512740D}"/>
+                <a16:creationId xmlns:a16="http://schemas.microsoft.com/office/drawing/2014/main" xmlns="" id="{479A5C67-41DB-2A49-849D-E8F07512740D}"/>
               </a:ext>
             </a:extLst>
           </p:cNvPr>
@@ -13464,7 +13654,7 @@
           <p:cNvPr id="56" name="Oval 55">
             <a:extLst>
               <a:ext uri="{FF2B5EF4-FFF2-40B4-BE49-F238E27FC236}">
-                <a16:creationId xmlns="" xmlns:a16="http://schemas.microsoft.com/office/drawing/2014/main" id="{479A5C67-41DB-2A49-849D-E8F07512740D}"/>
+                <a16:creationId xmlns:a16="http://schemas.microsoft.com/office/drawing/2014/main" xmlns="" id="{479A5C67-41DB-2A49-849D-E8F07512740D}"/>
               </a:ext>
             </a:extLst>
           </p:cNvPr>
@@ -13514,7 +13704,7 @@
           <p:cNvPr id="59" name="Straight Arrow Connector 58">
             <a:extLst>
               <a:ext uri="{FF2B5EF4-FFF2-40B4-BE49-F238E27FC236}">
-                <a16:creationId xmlns="" xmlns:a16="http://schemas.microsoft.com/office/drawing/2014/main" id="{880F0F40-144F-B542-9AA7-BE4B29F4CC42}"/>
+                <a16:creationId xmlns:a16="http://schemas.microsoft.com/office/drawing/2014/main" xmlns="" id="{880F0F40-144F-B542-9AA7-BE4B29F4CC42}"/>
               </a:ext>
             </a:extLst>
           </p:cNvPr>
@@ -13557,7 +13747,7 @@
           <p:cNvPr id="77" name="TextBox 76">
             <a:extLst>
               <a:ext uri="{FF2B5EF4-FFF2-40B4-BE49-F238E27FC236}">
-                <a16:creationId xmlns="" xmlns:a16="http://schemas.microsoft.com/office/drawing/2014/main" id="{6E8DC8CA-6C40-B54D-A397-C376073EB55B}"/>
+                <a16:creationId xmlns:a16="http://schemas.microsoft.com/office/drawing/2014/main" xmlns="" id="{6E8DC8CA-6C40-B54D-A397-C376073EB55B}"/>
               </a:ext>
             </a:extLst>
           </p:cNvPr>
@@ -13684,7 +13874,7 @@
           <p:cNvPr id="81" name="Rectangle: Rounded Corners 9">
             <a:extLst>
               <a:ext uri="{FF2B5EF4-FFF2-40B4-BE49-F238E27FC236}">
-                <a16:creationId xmlns="" xmlns:a16="http://schemas.microsoft.com/office/drawing/2014/main" id="{1AFE2ACF-FA76-624A-9515-B6DE4BD43A03}"/>
+                <a16:creationId xmlns:a16="http://schemas.microsoft.com/office/drawing/2014/main" xmlns="" id="{1AFE2ACF-FA76-624A-9515-B6DE4BD43A03}"/>
               </a:ext>
             </a:extLst>
           </p:cNvPr>
@@ -13737,7 +13927,7 @@
           <p:cNvPr id="82" name="Straight Arrow Connector 81">
             <a:extLst>
               <a:ext uri="{FF2B5EF4-FFF2-40B4-BE49-F238E27FC236}">
-                <a16:creationId xmlns="" xmlns:a16="http://schemas.microsoft.com/office/drawing/2014/main" id="{880F0F40-144F-B542-9AA7-BE4B29F4CC42}"/>
+                <a16:creationId xmlns:a16="http://schemas.microsoft.com/office/drawing/2014/main" xmlns="" id="{880F0F40-144F-B542-9AA7-BE4B29F4CC42}"/>
               </a:ext>
             </a:extLst>
           </p:cNvPr>
@@ -13779,7 +13969,7 @@
           <p:cNvPr id="83" name="Oval 82">
             <a:extLst>
               <a:ext uri="{FF2B5EF4-FFF2-40B4-BE49-F238E27FC236}">
-                <a16:creationId xmlns="" xmlns:a16="http://schemas.microsoft.com/office/drawing/2014/main" id="{479A5C67-41DB-2A49-849D-E8F07512740D}"/>
+                <a16:creationId xmlns:a16="http://schemas.microsoft.com/office/drawing/2014/main" xmlns="" id="{479A5C67-41DB-2A49-849D-E8F07512740D}"/>
               </a:ext>
             </a:extLst>
           </p:cNvPr>
@@ -13829,7 +14019,7 @@
           <p:cNvPr id="84" name="Straight Arrow Connector 83">
             <a:extLst>
               <a:ext uri="{FF2B5EF4-FFF2-40B4-BE49-F238E27FC236}">
-                <a16:creationId xmlns="" xmlns:a16="http://schemas.microsoft.com/office/drawing/2014/main" id="{EF4860F9-7D27-A542-A37E-F77796CAAC23}"/>
+                <a16:creationId xmlns:a16="http://schemas.microsoft.com/office/drawing/2014/main" xmlns="" id="{EF4860F9-7D27-A542-A37E-F77796CAAC23}"/>
               </a:ext>
             </a:extLst>
           </p:cNvPr>
@@ -13993,11 +14183,6 @@
               <a:rPr lang="en-US" dirty="0"/>
               <a:t>Competing Consumers </a:t>
             </a:r>
-            <a:r>
-              <a:rPr lang="en-US" dirty="0" smtClean="0"/>
-              <a:t> / Retry Delay Demo</a:t>
-            </a:r>
-            <a:endParaRPr lang="en-US" dirty="0"/>
           </a:p>
         </p:txBody>
       </p:sp>
@@ -14435,7 +14620,7 @@
           <p:cNvPr id="2" name="Title 1">
             <a:extLst>
               <a:ext uri="{FF2B5EF4-FFF2-40B4-BE49-F238E27FC236}">
-                <a16:creationId xmlns="" xmlns:a16="http://schemas.microsoft.com/office/drawing/2014/main" id="{AC7722AF-A2F1-EA42-9015-BE9DB6B90BA9}"/>
+                <a16:creationId xmlns:a16="http://schemas.microsoft.com/office/drawing/2014/main" xmlns="" id="{AC7722AF-A2F1-EA42-9015-BE9DB6B90BA9}"/>
               </a:ext>
             </a:extLst>
           </p:cNvPr>
@@ -14472,7 +14657,7 @@
           <p:cNvPr id="3" name="Content Placeholder 2">
             <a:extLst>
               <a:ext uri="{FF2B5EF4-FFF2-40B4-BE49-F238E27FC236}">
-                <a16:creationId xmlns="" xmlns:a16="http://schemas.microsoft.com/office/drawing/2014/main" id="{281E53C3-C76E-E246-B811-36479B204C6E}"/>
+                <a16:creationId xmlns:a16="http://schemas.microsoft.com/office/drawing/2014/main" xmlns="" id="{281E53C3-C76E-E246-B811-36479B204C6E}"/>
               </a:ext>
             </a:extLst>
           </p:cNvPr>
@@ -14671,7 +14856,7 @@
           <p:cNvPr id="2" name="Title 1">
             <a:extLst>
               <a:ext uri="{FF2B5EF4-FFF2-40B4-BE49-F238E27FC236}">
-                <a16:creationId xmlns="" xmlns:a16="http://schemas.microsoft.com/office/drawing/2014/main" id="{D19D98D7-1A37-3B46-9F52-28196C859D7B}"/>
+                <a16:creationId xmlns:a16="http://schemas.microsoft.com/office/drawing/2014/main" xmlns="" id="{D19D98D7-1A37-3B46-9F52-28196C859D7B}"/>
               </a:ext>
             </a:extLst>
           </p:cNvPr>
@@ -14699,7 +14884,7 @@
           <p:cNvPr id="3" name="Content Placeholder 2">
             <a:extLst>
               <a:ext uri="{FF2B5EF4-FFF2-40B4-BE49-F238E27FC236}">
-                <a16:creationId xmlns="" xmlns:a16="http://schemas.microsoft.com/office/drawing/2014/main" id="{886AE7E1-E8C6-9946-9790-4CC0B63F0BDC}"/>
+                <a16:creationId xmlns:a16="http://schemas.microsoft.com/office/drawing/2014/main" xmlns="" id="{886AE7E1-E8C6-9946-9790-4CC0B63F0BDC}"/>
               </a:ext>
             </a:extLst>
           </p:cNvPr>
@@ -14937,7 +15122,7 @@
           <p:cNvPr id="2" name="Title 1">
             <a:extLst>
               <a:ext uri="{FF2B5EF4-FFF2-40B4-BE49-F238E27FC236}">
-                <a16:creationId xmlns="" xmlns:a16="http://schemas.microsoft.com/office/drawing/2014/main" id="{3750261F-01B5-314F-9B46-E0A4FAD43627}"/>
+                <a16:creationId xmlns:a16="http://schemas.microsoft.com/office/drawing/2014/main" xmlns="" id="{3750261F-01B5-314F-9B46-E0A4FAD43627}"/>
               </a:ext>
             </a:extLst>
           </p:cNvPr>
@@ -14965,7 +15150,7 @@
           <p:cNvPr id="3" name="Content Placeholder 2">
             <a:extLst>
               <a:ext uri="{FF2B5EF4-FFF2-40B4-BE49-F238E27FC236}">
-                <a16:creationId xmlns="" xmlns:a16="http://schemas.microsoft.com/office/drawing/2014/main" id="{7DB9A663-ECCD-B74B-830D-F0EE31879A9E}"/>
+                <a16:creationId xmlns:a16="http://schemas.microsoft.com/office/drawing/2014/main" xmlns="" id="{7DB9A663-ECCD-B74B-830D-F0EE31879A9E}"/>
               </a:ext>
             </a:extLst>
           </p:cNvPr>
@@ -15597,7 +15782,9 @@
         </p:nvSpPr>
         <p:spPr/>
         <p:txBody>
-          <a:bodyPr/>
+          <a:bodyPr>
+            <a:normAutofit fontScale="92500" lnSpcReduction="10000"/>
+          </a:bodyPr>
           <a:lstStyle/>
           <a:p>
             <a:r>
@@ -15613,13 +15800,44 @@
           <a:p>
             <a:r>
               <a:rPr lang="en-US" dirty="0"/>
-              <a:t>Network protocol to enable client apps to communicate with compatible messaging systems</a:t>
-            </a:r>
-          </a:p>
-          <a:p>
+              <a:t>O</a:t>
+            </a:r>
+            <a:r>
+              <a:rPr lang="en-US" dirty="0" smtClean="0"/>
+              <a:t>pen </a:t>
+            </a:r>
             <a:r>
               <a:rPr lang="en-US" dirty="0"/>
-              <a:t>AMQP was designed with the following main characteristics as goals:</a:t>
+              <a:t>internet protocol for business </a:t>
+            </a:r>
+            <a:r>
+              <a:rPr lang="en-US" dirty="0" smtClean="0"/>
+              <a:t>messaging</a:t>
+            </a:r>
+          </a:p>
+          <a:p>
+            <a:r>
+              <a:rPr lang="en-US" dirty="0"/>
+              <a:t> </a:t>
+            </a:r>
+            <a:r>
+              <a:rPr lang="en-US" dirty="0" smtClean="0"/>
+              <a:t>Binary </a:t>
+            </a:r>
+            <a:r>
+              <a:rPr lang="en-US" dirty="0"/>
+              <a:t>wire-level protocol </a:t>
+            </a:r>
+            <a:endParaRPr lang="en-US" dirty="0" smtClean="0"/>
+          </a:p>
+          <a:p>
+            <a:r>
+              <a:rPr lang="en-US" dirty="0" smtClean="0"/>
+              <a:t>AMQP </a:t>
+            </a:r>
+            <a:r>
+              <a:rPr lang="en-US" dirty="0"/>
+              <a:t>was designed with the following main characteristics as goals:</a:t>
             </a:r>
           </a:p>
           <a:p>
@@ -15679,7 +15897,7 @@
         </p:blipFill>
         <p:spPr>
           <a:xfrm>
-            <a:off x="3960812" y="3163790"/>
+            <a:off x="4037012" y="3412067"/>
             <a:ext cx="7085019" cy="2676121"/>
           </a:xfrm>
           <a:prstGeom prst="rect">
@@ -15764,7 +15982,7 @@
           <p:cNvPr id="2" name="Title 1">
             <a:extLst>
               <a:ext uri="{FF2B5EF4-FFF2-40B4-BE49-F238E27FC236}">
-                <a16:creationId xmlns="" xmlns:a16="http://schemas.microsoft.com/office/drawing/2014/main" id="{78D74565-72C9-4B4E-BF3A-366A5626F7A4}"/>
+                <a16:creationId xmlns:a16="http://schemas.microsoft.com/office/drawing/2014/main" xmlns="" id="{78D74565-72C9-4B4E-BF3A-366A5626F7A4}"/>
               </a:ext>
             </a:extLst>
           </p:cNvPr>
@@ -15792,7 +16010,7 @@
           <p:cNvPr id="3" name="Content Placeholder 2">
             <a:extLst>
               <a:ext uri="{FF2B5EF4-FFF2-40B4-BE49-F238E27FC236}">
-                <a16:creationId xmlns="" xmlns:a16="http://schemas.microsoft.com/office/drawing/2014/main" id="{8D949DA3-C480-B44B-8373-4A468AD836F2}"/>
+                <a16:creationId xmlns:a16="http://schemas.microsoft.com/office/drawing/2014/main" xmlns="" id="{8D949DA3-C480-B44B-8373-4A468AD836F2}"/>
               </a:ext>
             </a:extLst>
           </p:cNvPr>
@@ -16102,7 +16320,19 @@
             </a:r>
             <a:r>
               <a:rPr lang="en-US" dirty="0" smtClean="0"/>
-              <a:t> – Chipping Away Story</a:t>
+              <a:t> </a:t>
+            </a:r>
+            <a:r>
+              <a:rPr lang="en-US" dirty="0"/>
+              <a:t>– </a:t>
+            </a:r>
+            <a:r>
+              <a:rPr lang="en-US" dirty="0" smtClean="0"/>
+              <a:t>changing </a:t>
+            </a:r>
+            <a:r>
+              <a:rPr lang="en-US" dirty="0"/>
+              <a:t>a monolith </a:t>
             </a:r>
             <a:endParaRPr lang="en-US" dirty="0"/>
           </a:p>
@@ -16139,7 +16369,7 @@
         </p:nvSpPr>
         <p:spPr>
           <a:xfrm>
-            <a:off x="2513012" y="4572000"/>
+            <a:off x="2665412" y="4876800"/>
             <a:ext cx="914400" cy="838200"/>
           </a:xfrm>
           <a:prstGeom prst="flowChartMagneticDrum">
@@ -16182,7 +16412,7 @@
         </p:nvSpPr>
         <p:spPr>
           <a:xfrm>
-            <a:off x="1516062" y="3422650"/>
+            <a:off x="1668462" y="3727450"/>
             <a:ext cx="914400" cy="533400"/>
           </a:xfrm>
           <a:prstGeom prst="rect">
@@ -16229,7 +16459,7 @@
         </p:nvSpPr>
         <p:spPr>
           <a:xfrm>
-            <a:off x="2659062" y="3422650"/>
+            <a:off x="2811462" y="3727450"/>
             <a:ext cx="914400" cy="533400"/>
           </a:xfrm>
           <a:prstGeom prst="rect">
@@ -16276,7 +16506,7 @@
         </p:nvSpPr>
         <p:spPr>
           <a:xfrm>
-            <a:off x="3878262" y="3422650"/>
+            <a:off x="4030662" y="3727450"/>
             <a:ext cx="914400" cy="533400"/>
           </a:xfrm>
           <a:prstGeom prst="rect">
@@ -16326,7 +16556,7 @@
         </p:nvCxnSpPr>
         <p:spPr>
           <a:xfrm>
-            <a:off x="2430462" y="3689350"/>
+            <a:off x="2582862" y="3994150"/>
             <a:ext cx="228600" cy="12700"/>
           </a:xfrm>
           <a:prstGeom prst="curvedConnector3">
@@ -16362,7 +16592,7 @@
         </p:nvCxnSpPr>
         <p:spPr>
           <a:xfrm rot="5400000" flipH="1" flipV="1">
-            <a:off x="3154362" y="2241550"/>
+            <a:off x="3306762" y="2546350"/>
             <a:ext cx="12700" cy="2362200"/>
           </a:xfrm>
           <a:prstGeom prst="curvedConnector3">
@@ -16401,7 +16631,7 @@
         </p:nvCxnSpPr>
         <p:spPr>
           <a:xfrm rot="5400000">
-            <a:off x="3725862" y="3346450"/>
+            <a:off x="3878262" y="3651250"/>
             <a:ext cx="12700" cy="1219200"/>
           </a:xfrm>
           <a:prstGeom prst="curvedConnector3">
@@ -16440,7 +16670,7 @@
         </p:nvCxnSpPr>
         <p:spPr>
           <a:xfrm rot="16200000" flipH="1">
-            <a:off x="1725612" y="4203700"/>
+            <a:off x="1878012" y="4508500"/>
             <a:ext cx="1035050" cy="539750"/>
           </a:xfrm>
           <a:prstGeom prst="curvedConnector2">
@@ -16477,7 +16707,7 @@
         </p:nvCxnSpPr>
         <p:spPr>
           <a:xfrm rot="10800000" flipH="1">
-            <a:off x="1516062" y="3422650"/>
+            <a:off x="1668462" y="3727450"/>
             <a:ext cx="457200" cy="266700"/>
           </a:xfrm>
           <a:prstGeom prst="curvedConnector4">
@@ -16517,7 +16747,7 @@
         </p:nvCxnSpPr>
         <p:spPr>
           <a:xfrm flipH="1">
-            <a:off x="3427412" y="3689350"/>
+            <a:off x="3579812" y="3994150"/>
             <a:ext cx="1365250" cy="1301750"/>
           </a:xfrm>
           <a:prstGeom prst="curvedConnector3">
@@ -16553,7 +16783,7 @@
         </p:nvSpPr>
         <p:spPr>
           <a:xfrm>
-            <a:off x="6704012" y="4073634"/>
+            <a:off x="6704012" y="4241800"/>
             <a:ext cx="914400" cy="533400"/>
           </a:xfrm>
           <a:prstGeom prst="rect">
@@ -16600,7 +16830,7 @@
         </p:nvSpPr>
         <p:spPr>
           <a:xfrm>
-            <a:off x="6704012" y="4833517"/>
+            <a:off x="6704012" y="5001683"/>
             <a:ext cx="914400" cy="838200"/>
           </a:xfrm>
           <a:prstGeom prst="flowChartMagneticDrum">
@@ -16645,7 +16875,7 @@
         </p:nvCxnSpPr>
         <p:spPr>
           <a:xfrm rot="5400000">
-            <a:off x="7072312" y="4695934"/>
+            <a:off x="7072312" y="4864100"/>
             <a:ext cx="177800" cy="12700"/>
           </a:xfrm>
           <a:prstGeom prst="curvedConnector3">
@@ -16683,7 +16913,7 @@
         </p:nvCxnSpPr>
         <p:spPr>
           <a:xfrm flipV="1">
-            <a:off x="10437811" y="3534462"/>
+            <a:off x="10437811" y="3702628"/>
             <a:ext cx="457202" cy="805872"/>
           </a:xfrm>
           <a:prstGeom prst="straightConnector1">
@@ -16717,7 +16947,7 @@
         </p:nvSpPr>
         <p:spPr>
           <a:xfrm>
-            <a:off x="10895012" y="4011289"/>
+            <a:off x="10895012" y="4179455"/>
             <a:ext cx="861454" cy="748145"/>
           </a:xfrm>
           <a:prstGeom prst="ellipse">
@@ -16761,7 +16991,7 @@
         </p:nvSpPr>
         <p:spPr>
           <a:xfrm>
-            <a:off x="8304212" y="4114800"/>
+            <a:off x="8304212" y="4282966"/>
             <a:ext cx="914400" cy="441434"/>
           </a:xfrm>
           <a:prstGeom prst="rect">
@@ -16804,7 +17034,7 @@
         </p:nvSpPr>
         <p:spPr>
           <a:xfrm>
-            <a:off x="9523412" y="4073634"/>
+            <a:off x="9523412" y="4241800"/>
             <a:ext cx="914399" cy="533400"/>
           </a:xfrm>
           <a:prstGeom prst="roundRect">
@@ -16854,7 +17084,7 @@
         </p:nvCxnSpPr>
         <p:spPr>
           <a:xfrm flipH="1" flipV="1">
-            <a:off x="9218612" y="4335517"/>
+            <a:off x="9218612" y="4503683"/>
             <a:ext cx="304800" cy="4817"/>
           </a:xfrm>
           <a:prstGeom prst="straightConnector1">
@@ -16891,7 +17121,7 @@
         </p:nvCxnSpPr>
         <p:spPr>
           <a:xfrm flipV="1">
-            <a:off x="7618412" y="4335517"/>
+            <a:off x="7618412" y="4503683"/>
             <a:ext cx="685800" cy="4817"/>
           </a:xfrm>
           <a:prstGeom prst="straightConnector1">
@@ -16927,7 +17157,7 @@
         </p:nvCxnSpPr>
         <p:spPr>
           <a:xfrm rot="5400000">
-            <a:off x="2735262" y="4191000"/>
+            <a:off x="2887662" y="4495800"/>
             <a:ext cx="615950" cy="146050"/>
           </a:xfrm>
           <a:prstGeom prst="curvedConnector3">
@@ -16963,7 +17193,7 @@
         </p:nvSpPr>
         <p:spPr>
           <a:xfrm>
-            <a:off x="6627812" y="2397234"/>
+            <a:off x="6627812" y="2565400"/>
             <a:ext cx="914400" cy="533400"/>
           </a:xfrm>
           <a:prstGeom prst="rect">
@@ -17010,7 +17240,7 @@
         </p:nvSpPr>
         <p:spPr>
           <a:xfrm>
-            <a:off x="6627812" y="3108434"/>
+            <a:off x="6627812" y="3276600"/>
             <a:ext cx="914400" cy="838200"/>
           </a:xfrm>
           <a:prstGeom prst="flowChartMagneticDrum">
@@ -17056,7 +17286,7 @@
         </p:nvCxnSpPr>
         <p:spPr>
           <a:xfrm rot="5400000">
-            <a:off x="6996112" y="3019534"/>
+            <a:off x="6996112" y="3187700"/>
             <a:ext cx="177800" cy="12700"/>
           </a:xfrm>
           <a:prstGeom prst="curvedConnector3">
@@ -17092,7 +17322,7 @@
         </p:nvSpPr>
         <p:spPr>
           <a:xfrm>
-            <a:off x="10895012" y="3108434"/>
+            <a:off x="10895012" y="3276600"/>
             <a:ext cx="861454" cy="748145"/>
           </a:xfrm>
           <a:prstGeom prst="ellipse">
@@ -17136,7 +17366,7 @@
         </p:nvSpPr>
         <p:spPr>
           <a:xfrm>
-            <a:off x="10971212" y="4937234"/>
+            <a:off x="10971212" y="5105400"/>
             <a:ext cx="861454" cy="748145"/>
           </a:xfrm>
           <a:prstGeom prst="ellipse">
@@ -17180,7 +17410,7 @@
         </p:nvCxnSpPr>
         <p:spPr>
           <a:xfrm>
-            <a:off x="10437811" y="4340334"/>
+            <a:off x="10437811" y="4508500"/>
             <a:ext cx="457201" cy="45028"/>
           </a:xfrm>
           <a:prstGeom prst="straightConnector1">
@@ -17216,7 +17446,7 @@
         </p:nvCxnSpPr>
         <p:spPr>
           <a:xfrm>
-            <a:off x="10437811" y="4340334"/>
+            <a:off x="10437811" y="4508500"/>
             <a:ext cx="533402" cy="946728"/>
           </a:xfrm>
           <a:prstGeom prst="straightConnector1">
@@ -17252,7 +17482,7 @@
         </p:nvCxnSpPr>
         <p:spPr>
           <a:xfrm>
-            <a:off x="7542212" y="2727434"/>
+            <a:off x="7542212" y="2895600"/>
             <a:ext cx="1219200" cy="1387366"/>
           </a:xfrm>
           <a:prstGeom prst="straightConnector1">
@@ -17285,7 +17515,7 @@
         </p:nvCxnSpPr>
         <p:spPr>
           <a:xfrm flipH="1">
-            <a:off x="6094413" y="2286000"/>
+            <a:off x="5942012" y="2438400"/>
             <a:ext cx="6880" cy="3581400"/>
           </a:xfrm>
           <a:prstGeom prst="line">
@@ -17308,6 +17538,48 @@
           </a:fontRef>
         </p:style>
       </p:cxnSp>
+      <p:sp>
+        <p:nvSpPr>
+          <p:cNvPr id="3" name="TextBox 2"/>
+          <p:cNvSpPr txBox="1"/>
+          <p:nvPr/>
+        </p:nvSpPr>
+        <p:spPr>
+          <a:xfrm>
+            <a:off x="1446212" y="1828800"/>
+            <a:ext cx="9753600" cy="461665"/>
+          </a:xfrm>
+          <a:prstGeom prst="rect">
+            <a:avLst/>
+          </a:prstGeom>
+          <a:noFill/>
+        </p:spPr>
+        <p:txBody>
+          <a:bodyPr wrap="square" rtlCol="0">
+            <a:spAutoFit/>
+          </a:bodyPr>
+          <a:lstStyle/>
+          <a:p>
+            <a:r>
+              <a:rPr lang="en-US" dirty="0" smtClean="0"/>
+              <a:t>Big Challenge - changing </a:t>
+            </a:r>
+            <a:r>
+              <a:rPr lang="en-US" dirty="0"/>
+              <a:t>the </a:t>
+            </a:r>
+            <a:r>
+              <a:rPr lang="en-US" dirty="0" smtClean="0"/>
+              <a:t>communication </a:t>
+            </a:r>
+            <a:r>
+              <a:rPr lang="en-US" dirty="0"/>
+              <a:t>pattern.</a:t>
+            </a:r>
+            <a:endParaRPr lang="en-US" dirty="0"/>
+          </a:p>
+        </p:txBody>
+      </p:sp>
     </p:spTree>
     <p:extLst>
       <p:ext uri="{BB962C8B-B14F-4D97-AF65-F5344CB8AC3E}">
@@ -18830,6 +19102,15 @@
 </file>
 
 <file path=customXml/item1.xml><?xml version="1.0" encoding="utf-8"?>
+<?mso-contentType ?>
+<FormTemplates xmlns="http://schemas.microsoft.com/sharepoint/v3/contenttype/forms">
+  <Display>DocumentLibraryForm</Display>
+  <Edit>AssetEditForm</Edit>
+  <New>DocumentLibraryForm</New>
+</FormTemplates>
+</file>
+
+<file path=customXml/item2.xml><?xml version="1.0" encoding="utf-8"?>
 <ct:contentTypeSchema xmlns:ct="http://schemas.microsoft.com/office/2006/metadata/contentType" xmlns:ma="http://schemas.microsoft.com/office/2006/metadata/properties/metaAttributes" ct:_="" ma:_="" ma:contentTypeName="TemplateFile" ma:contentTypeID="0x0101006EDDDB5EE6D98C44930B742096920B300400F5B6D36B3EF94B4E9A635CDF2A18F5B8" ma:contentTypeVersion="72" ma:contentTypeDescription="Create a new document." ma:contentTypeScope="" ma:versionID="a23e56308344d904b51738559c3d67c9">
   <xsd:schema xmlns:xsd="http://www.w3.org/2001/XMLSchema" xmlns:xs="http://www.w3.org/2001/XMLSchema" xmlns:p="http://schemas.microsoft.com/office/2006/metadata/properties" xmlns:ns2="4873beb7-5857-4685-be1f-d57550cc96cc" targetNamespace="http://schemas.microsoft.com/office/2006/metadata/properties" ma:root="true" ma:fieldsID="cd0908cc4600e77bf5da051303e00c8d" ns2:_="">
     <xsd:import namespace="4873beb7-5857-4685-be1f-d57550cc96cc"/>
@@ -19869,15 +20150,6 @@
 </ct:contentTypeSchema>
 </file>
 
-<file path=customXml/item2.xml><?xml version="1.0" encoding="utf-8"?>
-<?mso-contentType ?>
-<FormTemplates xmlns="http://schemas.microsoft.com/sharepoint/v3/contenttype/forms">
-  <Display>DocumentLibraryForm</Display>
-  <Edit>AssetEditForm</Edit>
-  <New>DocumentLibraryForm</New>
-</FormTemplates>
-</file>
-
 <file path=customXml/item3.xml><?xml version="1.0" encoding="utf-8"?>
 <p:properties xmlns:p="http://schemas.microsoft.com/office/2006/metadata/properties" xmlns:xsi="http://www.w3.org/2001/XMLSchema-instance" xmlns:pc="http://schemas.microsoft.com/office/infopath/2007/PartnerControls">
   <documentManagement>
@@ -20015,6 +20287,14 @@
 </file>
 
 <file path=customXml/itemProps1.xml><?xml version="1.0" encoding="utf-8"?>
+<ds:datastoreItem xmlns:ds="http://schemas.openxmlformats.org/officeDocument/2006/customXml" ds:itemID="{3836F65B-1B07-41EE-A0E8-BC6EF3855225}">
+  <ds:schemaRefs>
+    <ds:schemaRef ds:uri="http://schemas.microsoft.com/sharepoint/v3/contenttype/forms"/>
+  </ds:schemaRefs>
+</ds:datastoreItem>
+</file>
+
+<file path=customXml/itemProps2.xml><?xml version="1.0" encoding="utf-8"?>
 <ds:datastoreItem xmlns:ds="http://schemas.openxmlformats.org/officeDocument/2006/customXml" ds:itemID="{A09BF4D4-EF60-4196-BFC3-9462D607978C}">
   <ds:schemaRefs>
     <ds:schemaRef ds:uri="http://schemas.microsoft.com/office/2006/metadata/contentType"/>
@@ -20029,14 +20309,6 @@
     <ds:schemaRef ds:uri="http://purl.org/dc/elements/1.1/"/>
     <ds:schemaRef ds:uri="http://purl.org/dc/terms/"/>
     <ds:schemaRef ds:uri="http://schemas.microsoft.com/internal/obd"/>
-  </ds:schemaRefs>
-</ds:datastoreItem>
-</file>
-
-<file path=customXml/itemProps2.xml><?xml version="1.0" encoding="utf-8"?>
-<ds:datastoreItem xmlns:ds="http://schemas.openxmlformats.org/officeDocument/2006/customXml" ds:itemID="{3836F65B-1B07-41EE-A0E8-BC6EF3855225}">
-  <ds:schemaRefs>
-    <ds:schemaRef ds:uri="http://schemas.microsoft.com/sharepoint/v3/contenttype/forms"/>
   </ds:schemaRefs>
 </ds:datastoreItem>
 </file>

</xml_diff>

<commit_message>
Minor changes for .net user group talk
</commit_message>
<xml_diff>
--- a/Microservice_plumbing_with_RabbitMQ.pptx
+++ b/Microservice_plumbing_with_RabbitMQ.pptx
@@ -329,11 +329,11 @@
         </c:dLbls>
         <c:gapWidth val="164"/>
         <c:overlap val="-35"/>
-        <c:axId val="368181112"/>
-        <c:axId val="233295888"/>
+        <c:axId val="608165728"/>
+        <c:axId val="608165336"/>
       </c:barChart>
       <c:catAx>
-        <c:axId val="368181112"/>
+        <c:axId val="608165728"/>
         <c:scaling>
           <c:orientation val="minMax"/>
         </c:scaling>
@@ -428,7 +428,7 @@
             <a:endParaRPr lang="en-US"/>
           </a:p>
         </c:txPr>
-        <c:crossAx val="233295888"/>
+        <c:crossAx val="608165336"/>
         <c:crosses val="autoZero"/>
         <c:auto val="1"/>
         <c:lblAlgn val="ctr"/>
@@ -436,7 +436,7 @@
         <c:noMultiLvlLbl val="0"/>
       </c:catAx>
       <c:valAx>
-        <c:axId val="233295888"/>
+        <c:axId val="608165336"/>
         <c:scaling>
           <c:orientation val="minMax"/>
         </c:scaling>
@@ -538,7 +538,7 @@
             <a:endParaRPr lang="en-US"/>
           </a:p>
         </c:txPr>
-        <c:crossAx val="368181112"/>
+        <c:crossAx val="608165728"/>
         <c:crosses val="autoZero"/>
         <c:crossBetween val="between"/>
       </c:valAx>
@@ -1215,7 +1215,7 @@
           <a:p>
             <a:fld id="{FE5B4EDC-59C0-49C7-8ADA-5A781B329E02}" type="datetimeFigureOut">
               <a:rPr lang="en-US"/>
-              <a:t>9/27/2019</a:t>
+              <a:t>11/4/2019</a:t>
             </a:fld>
             <a:endParaRPr/>
           </a:p>
@@ -1380,7 +1380,7 @@
           <a:p>
             <a:fld id="{F2D8D46A-B586-417D-BFBD-8C8FE0AAF762}" type="datetimeFigureOut">
               <a:rPr lang="en-US"/>
-              <a:t>9/27/2019</a:t>
+              <a:t>11/4/2019</a:t>
             </a:fld>
             <a:endParaRPr/>
           </a:p>
@@ -4295,6 +4295,58 @@
               <a:defRPr/>
             </a:pPr>
             <a:r>
+              <a:rPr lang="en-US" dirty="0" smtClean="0"/>
+              <a:t>With </a:t>
+            </a:r>
+            <a:r>
+              <a:rPr lang="en-US" smtClean="0"/>
+              <a:t>retry plugin</a:t>
+            </a:r>
+            <a:endParaRPr lang="en-US" dirty="0" smtClean="0"/>
+          </a:p>
+          <a:p>
+            <a:pPr marL="0" indent="0" defTabSz="1242148">
+              <a:buFont typeface="Arial" panose="020B0604020202020204" pitchFamily="34" charset="0"/>
+              <a:buNone/>
+              <a:defRPr/>
+            </a:pPr>
+            <a:r>
+              <a:rPr lang="en-US" dirty="0" err="1" smtClean="0"/>
+              <a:t>docker</a:t>
+            </a:r>
+            <a:r>
+              <a:rPr lang="en-US" dirty="0" smtClean="0"/>
+              <a:t> run -d -h </a:t>
+            </a:r>
+            <a:r>
+              <a:rPr lang="en-US" dirty="0" err="1" smtClean="0"/>
+              <a:t>rabbitserver</a:t>
+            </a:r>
+            <a:r>
+              <a:rPr lang="en-US" dirty="0" smtClean="0"/>
+              <a:t> -p 15672:15672 -p 5672:5672 -p 5671:5671 --restart always </a:t>
+            </a:r>
+            <a:r>
+              <a:rPr lang="en-US" dirty="0" err="1" smtClean="0"/>
+              <a:t>rabbitmq:delay_plugin</a:t>
+            </a:r>
+            <a:endParaRPr lang="en-US" dirty="0" smtClean="0"/>
+          </a:p>
+          <a:p>
+            <a:pPr marL="0" indent="0" defTabSz="1242148">
+              <a:buFont typeface="Arial" panose="020B0604020202020204" pitchFamily="34" charset="0"/>
+              <a:buNone/>
+              <a:defRPr/>
+            </a:pPr>
+            <a:endParaRPr lang="en-US" dirty="0" smtClean="0"/>
+          </a:p>
+          <a:p>
+            <a:pPr marL="0" indent="0" defTabSz="1242148">
+              <a:buFont typeface="Arial" panose="020B0604020202020204" pitchFamily="34" charset="0"/>
+              <a:buNone/>
+              <a:defRPr/>
+            </a:pPr>
+            <a:r>
               <a:rPr lang="en-US" dirty="0" err="1" smtClean="0"/>
               <a:t>CloudAMQP</a:t>
             </a:r>
@@ -5036,7 +5088,7 @@
           <a:p>
             <a:fld id="{425A5273-4A92-4E2B-A616-9C53CA80431D}" type="datetime1">
               <a:rPr lang="en-US" smtClean="0"/>
-              <a:t>9/27/2019</a:t>
+              <a:t>11/4/2019</a:t>
             </a:fld>
             <a:endParaRPr lang="en-US"/>
           </a:p>
@@ -5260,7 +5312,7 @@
           <a:p>
             <a:fld id="{B0104835-0441-4E5E-9C58-BB74718A1C90}" type="datetime1">
               <a:rPr lang="en-US" smtClean="0"/>
-              <a:t>9/27/2019</a:t>
+              <a:t>11/4/2019</a:t>
             </a:fld>
             <a:endParaRPr lang="en-US"/>
           </a:p>
@@ -5532,7 +5584,7 @@
           <a:p>
             <a:fld id="{38162AD8-BBAE-4395-88CD-AD98819C927A}" type="datetime1">
               <a:rPr lang="en-US" smtClean="0"/>
-              <a:t>9/27/2019</a:t>
+              <a:t>11/4/2019</a:t>
             </a:fld>
             <a:endParaRPr lang="en-US"/>
           </a:p>
@@ -5722,7 +5774,7 @@
           <a:p>
             <a:fld id="{7EBD01FE-FCB7-49C9-B76B-55C61E2568EB}" type="datetime1">
               <a:rPr lang="en-US" smtClean="0"/>
-              <a:t>9/27/2019</a:t>
+              <a:t>11/4/2019</a:t>
             </a:fld>
             <a:endParaRPr lang="en-US"/>
           </a:p>
@@ -6081,7 +6133,7 @@
           <a:p>
             <a:fld id="{0EEE6AE0-BDDC-46E2-9CF1-E764D02D076B}" type="datetime1">
               <a:rPr lang="en-US" smtClean="0"/>
-              <a:t>9/27/2019</a:t>
+              <a:t>11/4/2019</a:t>
             </a:fld>
             <a:endParaRPr lang="en-US"/>
           </a:p>
@@ -6372,7 +6424,7 @@
           <a:p>
             <a:fld id="{5574084E-0E11-4C80-84A0-CE7193FA4654}" type="datetime1">
               <a:rPr lang="en-US" smtClean="0"/>
-              <a:t>9/27/2019</a:t>
+              <a:t>11/4/2019</a:t>
             </a:fld>
             <a:endParaRPr lang="en-US"/>
           </a:p>
@@ -6767,7 +6819,7 @@
           <a:p>
             <a:fld id="{F9641FBB-4AD5-4348-AAFA-9C7D16E116A1}" type="datetime1">
               <a:rPr lang="en-US" smtClean="0"/>
-              <a:t>9/27/2019</a:t>
+              <a:t>11/4/2019</a:t>
             </a:fld>
             <a:endParaRPr lang="en-US"/>
           </a:p>
@@ -6901,7 +6953,7 @@
           <a:p>
             <a:fld id="{CB8E17E8-F59F-4736-A5AF-C5DA5082F4C4}" type="datetime1">
               <a:rPr lang="en-US" smtClean="0"/>
-              <a:t>9/27/2019</a:t>
+              <a:t>11/4/2019</a:t>
             </a:fld>
             <a:endParaRPr lang="en-US"/>
           </a:p>
@@ -7088,7 +7140,7 @@
           <a:p>
             <a:fld id="{0C0D84EB-296C-4D32-AF08-529ACD4137FA}" type="datetime1">
               <a:rPr lang="en-US" smtClean="0"/>
-              <a:t>9/27/2019</a:t>
+              <a:t>11/4/2019</a:t>
             </a:fld>
             <a:endParaRPr lang="en-US"/>
           </a:p>
@@ -7458,7 +7510,7 @@
           <a:p>
             <a:fld id="{811775C6-CCB8-4FF4-BDF0-E6FD5927766D}" type="datetime1">
               <a:rPr lang="en-US" smtClean="0"/>
-              <a:t>9/27/2019</a:t>
+              <a:t>11/4/2019</a:t>
             </a:fld>
             <a:endParaRPr lang="en-US"/>
           </a:p>
@@ -7856,7 +7908,7 @@
           <a:p>
             <a:fld id="{71A976D0-1055-4775-B26A-B26F49EB2AC6}" type="datetime1">
               <a:rPr lang="en-US" smtClean="0"/>
-              <a:t>9/27/2019</a:t>
+              <a:t>11/4/2019</a:t>
             </a:fld>
             <a:endParaRPr lang="en-US"/>
           </a:p>
@@ -8159,7 +8211,7 @@
           <a:p>
             <a:fld id="{570E9A61-A31B-44AF-81D7-DB6DE242223A}" type="datetime1">
               <a:rPr lang="en-US" smtClean="0"/>
-              <a:t>9/27/2019</a:t>
+              <a:t>11/4/2019</a:t>
             </a:fld>
             <a:endParaRPr lang="en-US"/>
           </a:p>
@@ -9079,7 +9131,7 @@
           <p:cNvPr id="2" name="Title 1">
             <a:extLst>
               <a:ext uri="{FF2B5EF4-FFF2-40B4-BE49-F238E27FC236}">
-                <a16:creationId xmlns="" xmlns:a16="http://schemas.microsoft.com/office/drawing/2014/main" id="{21A62E6F-8298-1C47-AF4C-D6B380DC5E27}"/>
+                <a16:creationId xmlns:a16="http://schemas.microsoft.com/office/drawing/2014/main" xmlns="" id="{21A62E6F-8298-1C47-AF4C-D6B380DC5E27}"/>
               </a:ext>
             </a:extLst>
           </p:cNvPr>
@@ -9112,7 +9164,7 @@
           <p:cNvPr id="3" name="Content Placeholder 2">
             <a:extLst>
               <a:ext uri="{FF2B5EF4-FFF2-40B4-BE49-F238E27FC236}">
-                <a16:creationId xmlns="" xmlns:a16="http://schemas.microsoft.com/office/drawing/2014/main" id="{B8E69FE9-10A4-C042-92DF-E8733DFFC11A}"/>
+                <a16:creationId xmlns:a16="http://schemas.microsoft.com/office/drawing/2014/main" xmlns="" id="{B8E69FE9-10A4-C042-92DF-E8733DFFC11A}"/>
               </a:ext>
             </a:extLst>
           </p:cNvPr>
@@ -9287,7 +9339,7 @@
           <p:cNvPr id="2" name="Title 1">
             <a:extLst>
               <a:ext uri="{FF2B5EF4-FFF2-40B4-BE49-F238E27FC236}">
-                <a16:creationId xmlns="" xmlns:a16="http://schemas.microsoft.com/office/drawing/2014/main" id="{3361FBBD-A24C-6D42-8F8A-A6AA065CB091}"/>
+                <a16:creationId xmlns:a16="http://schemas.microsoft.com/office/drawing/2014/main" xmlns="" id="{3361FBBD-A24C-6D42-8F8A-A6AA065CB091}"/>
               </a:ext>
             </a:extLst>
           </p:cNvPr>
@@ -9320,7 +9372,7 @@
           <p:cNvPr id="3" name="Content Placeholder 2">
             <a:extLst>
               <a:ext uri="{FF2B5EF4-FFF2-40B4-BE49-F238E27FC236}">
-                <a16:creationId xmlns="" xmlns:a16="http://schemas.microsoft.com/office/drawing/2014/main" id="{6740D746-4A8D-C247-BFC8-427B66B6126A}"/>
+                <a16:creationId xmlns:a16="http://schemas.microsoft.com/office/drawing/2014/main" xmlns="" id="{6740D746-4A8D-C247-BFC8-427B66B6126A}"/>
               </a:ext>
             </a:extLst>
           </p:cNvPr>
@@ -9751,7 +9803,7 @@
           <p:cNvPr id="2" name="Title 1">
             <a:extLst>
               <a:ext uri="{FF2B5EF4-FFF2-40B4-BE49-F238E27FC236}">
-                <a16:creationId xmlns="" xmlns:a16="http://schemas.microsoft.com/office/drawing/2014/main" id="{982BC3A4-28FC-CE40-9B85-1AC384A122B3}"/>
+                <a16:creationId xmlns:a16="http://schemas.microsoft.com/office/drawing/2014/main" xmlns="" id="{982BC3A4-28FC-CE40-9B85-1AC384A122B3}"/>
               </a:ext>
             </a:extLst>
           </p:cNvPr>
@@ -9779,7 +9831,7 @@
           <p:cNvPr id="4" name="Oval 3">
             <a:extLst>
               <a:ext uri="{FF2B5EF4-FFF2-40B4-BE49-F238E27FC236}">
-                <a16:creationId xmlns="" xmlns:a16="http://schemas.microsoft.com/office/drawing/2014/main" id="{98E12714-002A-8F45-B772-89E1E4B6AFAD}"/>
+                <a16:creationId xmlns:a16="http://schemas.microsoft.com/office/drawing/2014/main" xmlns="" id="{98E12714-002A-8F45-B772-89E1E4B6AFAD}"/>
               </a:ext>
             </a:extLst>
           </p:cNvPr>
@@ -9829,7 +9881,7 @@
           <p:cNvPr id="5" name="Rectangle: Rounded Corners 4">
             <a:extLst>
               <a:ext uri="{FF2B5EF4-FFF2-40B4-BE49-F238E27FC236}">
-                <a16:creationId xmlns="" xmlns:a16="http://schemas.microsoft.com/office/drawing/2014/main" id="{C984AE45-7F4B-3E4E-A4AB-324EA04B080A}"/>
+                <a16:creationId xmlns:a16="http://schemas.microsoft.com/office/drawing/2014/main" xmlns="" id="{C984AE45-7F4B-3E4E-A4AB-324EA04B080A}"/>
               </a:ext>
             </a:extLst>
           </p:cNvPr>
@@ -9881,7 +9933,7 @@
           <p:cNvPr id="6" name="TextBox 5">
             <a:extLst>
               <a:ext uri="{FF2B5EF4-FFF2-40B4-BE49-F238E27FC236}">
-                <a16:creationId xmlns="" xmlns:a16="http://schemas.microsoft.com/office/drawing/2014/main" id="{D0E690B5-65C2-1A4D-84B7-B0BBEA911F8E}"/>
+                <a16:creationId xmlns:a16="http://schemas.microsoft.com/office/drawing/2014/main" xmlns="" id="{D0E690B5-65C2-1A4D-84B7-B0BBEA911F8E}"/>
               </a:ext>
             </a:extLst>
           </p:cNvPr>
@@ -9935,7 +9987,7 @@
           <p:cNvPr id="7" name="Straight Arrow Connector 6">
             <a:extLst>
               <a:ext uri="{FF2B5EF4-FFF2-40B4-BE49-F238E27FC236}">
-                <a16:creationId xmlns="" xmlns:a16="http://schemas.microsoft.com/office/drawing/2014/main" id="{45AAEBCF-749E-FB43-8CB1-EAEA4AE8EF88}"/>
+                <a16:creationId xmlns:a16="http://schemas.microsoft.com/office/drawing/2014/main" xmlns="" id="{45AAEBCF-749E-FB43-8CB1-EAEA4AE8EF88}"/>
               </a:ext>
             </a:extLst>
           </p:cNvPr>
@@ -9978,7 +10030,7 @@
           <p:cNvPr id="20" name="TextBox 19">
             <a:extLst>
               <a:ext uri="{FF2B5EF4-FFF2-40B4-BE49-F238E27FC236}">
-                <a16:creationId xmlns="" xmlns:a16="http://schemas.microsoft.com/office/drawing/2014/main" id="{1959D82E-0456-144D-B2D3-6EA944A9C4EA}"/>
+                <a16:creationId xmlns:a16="http://schemas.microsoft.com/office/drawing/2014/main" xmlns="" id="{1959D82E-0456-144D-B2D3-6EA944A9C4EA}"/>
               </a:ext>
             </a:extLst>
           </p:cNvPr>
@@ -10019,7 +10071,7 @@
           <p:cNvPr id="3" name="Rectangle: Rounded Corners 2">
             <a:extLst>
               <a:ext uri="{FF2B5EF4-FFF2-40B4-BE49-F238E27FC236}">
-                <a16:creationId xmlns="" xmlns:a16="http://schemas.microsoft.com/office/drawing/2014/main" id="{F43E48B1-B1C1-FA45-AE69-A78BD07EA765}"/>
+                <a16:creationId xmlns:a16="http://schemas.microsoft.com/office/drawing/2014/main" xmlns="" id="{F43E48B1-B1C1-FA45-AE69-A78BD07EA765}"/>
               </a:ext>
             </a:extLst>
           </p:cNvPr>
@@ -10072,7 +10124,7 @@
           <p:cNvPr id="8" name="Rectangle: Rounded Corners 7">
             <a:extLst>
               <a:ext uri="{FF2B5EF4-FFF2-40B4-BE49-F238E27FC236}">
-                <a16:creationId xmlns="" xmlns:a16="http://schemas.microsoft.com/office/drawing/2014/main" id="{21B78B04-1092-CF42-80A7-21846DB82B0C}"/>
+                <a16:creationId xmlns:a16="http://schemas.microsoft.com/office/drawing/2014/main" xmlns="" id="{21B78B04-1092-CF42-80A7-21846DB82B0C}"/>
               </a:ext>
             </a:extLst>
           </p:cNvPr>
@@ -10125,7 +10177,7 @@
           <p:cNvPr id="10" name="Rectangle: Rounded Corners 9">
             <a:extLst>
               <a:ext uri="{FF2B5EF4-FFF2-40B4-BE49-F238E27FC236}">
-                <a16:creationId xmlns="" xmlns:a16="http://schemas.microsoft.com/office/drawing/2014/main" id="{1AFE2ACF-FA76-624A-9515-B6DE4BD43A03}"/>
+                <a16:creationId xmlns:a16="http://schemas.microsoft.com/office/drawing/2014/main" xmlns="" id="{1AFE2ACF-FA76-624A-9515-B6DE4BD43A03}"/>
               </a:ext>
             </a:extLst>
           </p:cNvPr>
@@ -10178,7 +10230,7 @@
           <p:cNvPr id="13" name="TextBox 12">
             <a:extLst>
               <a:ext uri="{FF2B5EF4-FFF2-40B4-BE49-F238E27FC236}">
-                <a16:creationId xmlns="" xmlns:a16="http://schemas.microsoft.com/office/drawing/2014/main" id="{6E8DC8CA-6C40-B54D-A397-C376073EB55B}"/>
+                <a16:creationId xmlns:a16="http://schemas.microsoft.com/office/drawing/2014/main" xmlns="" id="{6E8DC8CA-6C40-B54D-A397-C376073EB55B}"/>
               </a:ext>
             </a:extLst>
           </p:cNvPr>
@@ -10215,7 +10267,7 @@
           <p:cNvPr id="17" name="Straight Arrow Connector 16">
             <a:extLst>
               <a:ext uri="{FF2B5EF4-FFF2-40B4-BE49-F238E27FC236}">
-                <a16:creationId xmlns="" xmlns:a16="http://schemas.microsoft.com/office/drawing/2014/main" id="{43EF946B-702D-7D42-9345-B8E6E59407C7}"/>
+                <a16:creationId xmlns:a16="http://schemas.microsoft.com/office/drawing/2014/main" xmlns="" id="{43EF946B-702D-7D42-9345-B8E6E59407C7}"/>
               </a:ext>
             </a:extLst>
           </p:cNvPr>
@@ -10258,7 +10310,7 @@
           <p:cNvPr id="32" name="Straight Arrow Connector 31">
             <a:extLst>
               <a:ext uri="{FF2B5EF4-FFF2-40B4-BE49-F238E27FC236}">
-                <a16:creationId xmlns="" xmlns:a16="http://schemas.microsoft.com/office/drawing/2014/main" id="{EF4860F9-7D27-A542-A37E-F77796CAAC23}"/>
+                <a16:creationId xmlns:a16="http://schemas.microsoft.com/office/drawing/2014/main" xmlns="" id="{EF4860F9-7D27-A542-A37E-F77796CAAC23}"/>
               </a:ext>
             </a:extLst>
           </p:cNvPr>
@@ -10301,7 +10353,7 @@
           <p:cNvPr id="38" name="Straight Arrow Connector 37">
             <a:extLst>
               <a:ext uri="{FF2B5EF4-FFF2-40B4-BE49-F238E27FC236}">
-                <a16:creationId xmlns="" xmlns:a16="http://schemas.microsoft.com/office/drawing/2014/main" id="{618A4F59-D514-A342-83E8-E31334D078F8}"/>
+                <a16:creationId xmlns:a16="http://schemas.microsoft.com/office/drawing/2014/main" xmlns="" id="{618A4F59-D514-A342-83E8-E31334D078F8}"/>
               </a:ext>
             </a:extLst>
           </p:cNvPr>
@@ -10344,7 +10396,7 @@
           <p:cNvPr id="68" name="Oval 67">
             <a:extLst>
               <a:ext uri="{FF2B5EF4-FFF2-40B4-BE49-F238E27FC236}">
-                <a16:creationId xmlns="" xmlns:a16="http://schemas.microsoft.com/office/drawing/2014/main" id="{4B1ACD04-9615-B147-8D50-5866372EAEA5}"/>
+                <a16:creationId xmlns:a16="http://schemas.microsoft.com/office/drawing/2014/main" xmlns="" id="{4B1ACD04-9615-B147-8D50-5866372EAEA5}"/>
               </a:ext>
             </a:extLst>
           </p:cNvPr>
@@ -10393,7 +10445,7 @@
           <p:cNvPr id="70" name="Oval 69">
             <a:extLst>
               <a:ext uri="{FF2B5EF4-FFF2-40B4-BE49-F238E27FC236}">
-                <a16:creationId xmlns="" xmlns:a16="http://schemas.microsoft.com/office/drawing/2014/main" id="{479A5C67-41DB-2A49-849D-E8F07512740D}"/>
+                <a16:creationId xmlns:a16="http://schemas.microsoft.com/office/drawing/2014/main" xmlns="" id="{479A5C67-41DB-2A49-849D-E8F07512740D}"/>
               </a:ext>
             </a:extLst>
           </p:cNvPr>
@@ -10442,7 +10494,7 @@
           <p:cNvPr id="72" name="Oval 71">
             <a:extLst>
               <a:ext uri="{FF2B5EF4-FFF2-40B4-BE49-F238E27FC236}">
-                <a16:creationId xmlns="" xmlns:a16="http://schemas.microsoft.com/office/drawing/2014/main" id="{2672164B-4C01-6D44-B5E7-F0293F56E78E}"/>
+                <a16:creationId xmlns:a16="http://schemas.microsoft.com/office/drawing/2014/main" xmlns="" id="{2672164B-4C01-6D44-B5E7-F0293F56E78E}"/>
               </a:ext>
             </a:extLst>
           </p:cNvPr>
@@ -10492,7 +10544,7 @@
           <p:cNvPr id="79" name="Straight Arrow Connector 78">
             <a:extLst>
               <a:ext uri="{FF2B5EF4-FFF2-40B4-BE49-F238E27FC236}">
-                <a16:creationId xmlns="" xmlns:a16="http://schemas.microsoft.com/office/drawing/2014/main" id="{C26993FA-3054-3244-8ACC-4EB79E2C6E38}"/>
+                <a16:creationId xmlns:a16="http://schemas.microsoft.com/office/drawing/2014/main" xmlns="" id="{C26993FA-3054-3244-8ACC-4EB79E2C6E38}"/>
               </a:ext>
             </a:extLst>
           </p:cNvPr>
@@ -10535,7 +10587,7 @@
           <p:cNvPr id="87" name="Straight Arrow Connector 86">
             <a:extLst>
               <a:ext uri="{FF2B5EF4-FFF2-40B4-BE49-F238E27FC236}">
-                <a16:creationId xmlns="" xmlns:a16="http://schemas.microsoft.com/office/drawing/2014/main" id="{880F0F40-144F-B542-9AA7-BE4B29F4CC42}"/>
+                <a16:creationId xmlns:a16="http://schemas.microsoft.com/office/drawing/2014/main" xmlns="" id="{880F0F40-144F-B542-9AA7-BE4B29F4CC42}"/>
               </a:ext>
             </a:extLst>
           </p:cNvPr>
@@ -10578,7 +10630,7 @@
           <p:cNvPr id="92" name="Straight Arrow Connector 91">
             <a:extLst>
               <a:ext uri="{FF2B5EF4-FFF2-40B4-BE49-F238E27FC236}">
-                <a16:creationId xmlns="" xmlns:a16="http://schemas.microsoft.com/office/drawing/2014/main" id="{E17C5110-CA13-F741-AD04-1C732E1FE1CA}"/>
+                <a16:creationId xmlns:a16="http://schemas.microsoft.com/office/drawing/2014/main" xmlns="" id="{E17C5110-CA13-F741-AD04-1C732E1FE1CA}"/>
               </a:ext>
             </a:extLst>
           </p:cNvPr>
@@ -10644,7 +10696,7 @@
           <p:cNvPr id="49" name="TextBox 48">
             <a:extLst>
               <a:ext uri="{FF2B5EF4-FFF2-40B4-BE49-F238E27FC236}">
-                <a16:creationId xmlns="" xmlns:a16="http://schemas.microsoft.com/office/drawing/2014/main" id="{6E8DC8CA-6C40-B54D-A397-C376073EB55B}"/>
+                <a16:creationId xmlns:a16="http://schemas.microsoft.com/office/drawing/2014/main" xmlns="" id="{6E8DC8CA-6C40-B54D-A397-C376073EB55B}"/>
               </a:ext>
             </a:extLst>
           </p:cNvPr>
@@ -10681,7 +10733,7 @@
           <p:cNvPr id="50" name="TextBox 49">
             <a:extLst>
               <a:ext uri="{FF2B5EF4-FFF2-40B4-BE49-F238E27FC236}">
-                <a16:creationId xmlns="" xmlns:a16="http://schemas.microsoft.com/office/drawing/2014/main" id="{6E8DC8CA-6C40-B54D-A397-C376073EB55B}"/>
+                <a16:creationId xmlns:a16="http://schemas.microsoft.com/office/drawing/2014/main" xmlns="" id="{6E8DC8CA-6C40-B54D-A397-C376073EB55B}"/>
               </a:ext>
             </a:extLst>
           </p:cNvPr>
@@ -10796,7 +10848,7 @@
           <p:cNvPr id="2" name="Title 1">
             <a:extLst>
               <a:ext uri="{FF2B5EF4-FFF2-40B4-BE49-F238E27FC236}">
-                <a16:creationId xmlns="" xmlns:a16="http://schemas.microsoft.com/office/drawing/2014/main" id="{1DA78D53-10E1-3D47-8D9D-2F50C5A7A488}"/>
+                <a16:creationId xmlns:a16="http://schemas.microsoft.com/office/drawing/2014/main" xmlns="" id="{1DA78D53-10E1-3D47-8D9D-2F50C5A7A488}"/>
               </a:ext>
             </a:extLst>
           </p:cNvPr>
@@ -10824,7 +10876,7 @@
           <p:cNvPr id="4" name="Oval 3">
             <a:extLst>
               <a:ext uri="{FF2B5EF4-FFF2-40B4-BE49-F238E27FC236}">
-                <a16:creationId xmlns="" xmlns:a16="http://schemas.microsoft.com/office/drawing/2014/main" id="{33B998C3-52C7-444E-BB5A-FC8C4EC8A96C}"/>
+                <a16:creationId xmlns:a16="http://schemas.microsoft.com/office/drawing/2014/main" xmlns="" id="{33B998C3-52C7-444E-BB5A-FC8C4EC8A96C}"/>
               </a:ext>
             </a:extLst>
           </p:cNvPr>
@@ -10874,7 +10926,7 @@
           <p:cNvPr id="5" name="Straight Arrow Connector 4">
             <a:extLst>
               <a:ext uri="{FF2B5EF4-FFF2-40B4-BE49-F238E27FC236}">
-                <a16:creationId xmlns="" xmlns:a16="http://schemas.microsoft.com/office/drawing/2014/main" id="{26063CBA-F54D-394A-A34F-4115EC0D3847}"/>
+                <a16:creationId xmlns:a16="http://schemas.microsoft.com/office/drawing/2014/main" xmlns="" id="{26063CBA-F54D-394A-A34F-4115EC0D3847}"/>
               </a:ext>
             </a:extLst>
           </p:cNvPr>
@@ -10917,7 +10969,7 @@
           <p:cNvPr id="22" name="Oval 21">
             <a:extLst>
               <a:ext uri="{FF2B5EF4-FFF2-40B4-BE49-F238E27FC236}">
-                <a16:creationId xmlns="" xmlns:a16="http://schemas.microsoft.com/office/drawing/2014/main" id="{787ACDD4-72C7-3A4D-AA5B-3354BABF069D}"/>
+                <a16:creationId xmlns:a16="http://schemas.microsoft.com/office/drawing/2014/main" xmlns="" id="{787ACDD4-72C7-3A4D-AA5B-3354BABF069D}"/>
               </a:ext>
             </a:extLst>
           </p:cNvPr>
@@ -10967,7 +11019,7 @@
           <p:cNvPr id="25" name="Rectangle: Rounded Corners 24">
             <a:extLst>
               <a:ext uri="{FF2B5EF4-FFF2-40B4-BE49-F238E27FC236}">
-                <a16:creationId xmlns="" xmlns:a16="http://schemas.microsoft.com/office/drawing/2014/main" id="{3F704208-5435-C347-A13F-823382A2FCF3}"/>
+                <a16:creationId xmlns:a16="http://schemas.microsoft.com/office/drawing/2014/main" xmlns="" id="{3F704208-5435-C347-A13F-823382A2FCF3}"/>
               </a:ext>
             </a:extLst>
           </p:cNvPr>
@@ -11024,7 +11076,7 @@
           <p:cNvPr id="31" name="Rectangle: Rounded Corners 30">
             <a:extLst>
               <a:ext uri="{FF2B5EF4-FFF2-40B4-BE49-F238E27FC236}">
-                <a16:creationId xmlns="" xmlns:a16="http://schemas.microsoft.com/office/drawing/2014/main" id="{9F04162C-BD17-3146-9F79-689FAAE9C26C}"/>
+                <a16:creationId xmlns:a16="http://schemas.microsoft.com/office/drawing/2014/main" xmlns="" id="{9F04162C-BD17-3146-9F79-689FAAE9C26C}"/>
               </a:ext>
             </a:extLst>
           </p:cNvPr>
@@ -11076,7 +11128,7 @@
           <p:cNvPr id="33" name="Rectangle: Rounded Corners 32">
             <a:extLst>
               <a:ext uri="{FF2B5EF4-FFF2-40B4-BE49-F238E27FC236}">
-                <a16:creationId xmlns="" xmlns:a16="http://schemas.microsoft.com/office/drawing/2014/main" id="{D7D8B533-0307-F049-8D0C-C8BE02F5F079}"/>
+                <a16:creationId xmlns:a16="http://schemas.microsoft.com/office/drawing/2014/main" xmlns="" id="{D7D8B533-0307-F049-8D0C-C8BE02F5F079}"/>
               </a:ext>
             </a:extLst>
           </p:cNvPr>
@@ -11128,7 +11180,7 @@
           <p:cNvPr id="35" name="Rectangle: Rounded Corners 34">
             <a:extLst>
               <a:ext uri="{FF2B5EF4-FFF2-40B4-BE49-F238E27FC236}">
-                <a16:creationId xmlns="" xmlns:a16="http://schemas.microsoft.com/office/drawing/2014/main" id="{40EE904D-821E-474D-9819-E5D34B320140}"/>
+                <a16:creationId xmlns:a16="http://schemas.microsoft.com/office/drawing/2014/main" xmlns="" id="{40EE904D-821E-474D-9819-E5D34B320140}"/>
               </a:ext>
             </a:extLst>
           </p:cNvPr>
@@ -11180,7 +11232,7 @@
           <p:cNvPr id="36" name="Straight Arrow Connector 35">
             <a:extLst>
               <a:ext uri="{FF2B5EF4-FFF2-40B4-BE49-F238E27FC236}">
-                <a16:creationId xmlns="" xmlns:a16="http://schemas.microsoft.com/office/drawing/2014/main" id="{F8AAA69A-E8D9-1B4E-996F-34029F7F7E44}"/>
+                <a16:creationId xmlns:a16="http://schemas.microsoft.com/office/drawing/2014/main" xmlns="" id="{F8AAA69A-E8D9-1B4E-996F-34029F7F7E44}"/>
               </a:ext>
             </a:extLst>
           </p:cNvPr>
@@ -11223,7 +11275,7 @@
           <p:cNvPr id="46" name="Straight Arrow Connector 45">
             <a:extLst>
               <a:ext uri="{FF2B5EF4-FFF2-40B4-BE49-F238E27FC236}">
-                <a16:creationId xmlns="" xmlns:a16="http://schemas.microsoft.com/office/drawing/2014/main" id="{6E84F913-E9AC-3A45-B5C8-2D61DB082359}"/>
+                <a16:creationId xmlns:a16="http://schemas.microsoft.com/office/drawing/2014/main" xmlns="" id="{6E84F913-E9AC-3A45-B5C8-2D61DB082359}"/>
               </a:ext>
             </a:extLst>
           </p:cNvPr>
@@ -11266,7 +11318,7 @@
           <p:cNvPr id="54" name="Straight Arrow Connector 53">
             <a:extLst>
               <a:ext uri="{FF2B5EF4-FFF2-40B4-BE49-F238E27FC236}">
-                <a16:creationId xmlns="" xmlns:a16="http://schemas.microsoft.com/office/drawing/2014/main" id="{FA5D730D-1095-5C46-9B9F-63A0C8FF4EC4}"/>
+                <a16:creationId xmlns:a16="http://schemas.microsoft.com/office/drawing/2014/main" xmlns="" id="{FA5D730D-1095-5C46-9B9F-63A0C8FF4EC4}"/>
               </a:ext>
             </a:extLst>
           </p:cNvPr>
@@ -11309,7 +11361,7 @@
           <p:cNvPr id="68" name="Straight Arrow Connector 67">
             <a:extLst>
               <a:ext uri="{FF2B5EF4-FFF2-40B4-BE49-F238E27FC236}">
-                <a16:creationId xmlns="" xmlns:a16="http://schemas.microsoft.com/office/drawing/2014/main" id="{CD23FC08-D44C-1247-8148-0233A8134F8B}"/>
+                <a16:creationId xmlns:a16="http://schemas.microsoft.com/office/drawing/2014/main" xmlns="" id="{CD23FC08-D44C-1247-8148-0233A8134F8B}"/>
               </a:ext>
             </a:extLst>
           </p:cNvPr>
@@ -11351,7 +11403,7 @@
           <p:cNvPr id="3" name="Straight Arrow Connector 2">
             <a:extLst>
               <a:ext uri="{FF2B5EF4-FFF2-40B4-BE49-F238E27FC236}">
-                <a16:creationId xmlns="" xmlns:a16="http://schemas.microsoft.com/office/drawing/2014/main" id="{BFC43AB4-1F6A-C64C-9E4B-092E474C78D3}"/>
+                <a16:creationId xmlns:a16="http://schemas.microsoft.com/office/drawing/2014/main" xmlns="" id="{BFC43AB4-1F6A-C64C-9E4B-092E474C78D3}"/>
               </a:ext>
             </a:extLst>
           </p:cNvPr>
@@ -11393,7 +11445,7 @@
           <p:cNvPr id="8" name="Straight Arrow Connector 7">
             <a:extLst>
               <a:ext uri="{FF2B5EF4-FFF2-40B4-BE49-F238E27FC236}">
-                <a16:creationId xmlns="" xmlns:a16="http://schemas.microsoft.com/office/drawing/2014/main" id="{40981754-DC72-6D40-A1E0-9DCF49D13C78}"/>
+                <a16:creationId xmlns:a16="http://schemas.microsoft.com/office/drawing/2014/main" xmlns="" id="{40981754-DC72-6D40-A1E0-9DCF49D13C78}"/>
               </a:ext>
             </a:extLst>
           </p:cNvPr>
@@ -11459,7 +11511,7 @@
           <p:cNvPr id="27" name="Oval 26">
             <a:extLst>
               <a:ext uri="{FF2B5EF4-FFF2-40B4-BE49-F238E27FC236}">
-                <a16:creationId xmlns="" xmlns:a16="http://schemas.microsoft.com/office/drawing/2014/main" id="{787ACDD4-72C7-3A4D-AA5B-3354BABF069D}"/>
+                <a16:creationId xmlns:a16="http://schemas.microsoft.com/office/drawing/2014/main" xmlns="" id="{787ACDD4-72C7-3A4D-AA5B-3354BABF069D}"/>
               </a:ext>
             </a:extLst>
           </p:cNvPr>
@@ -11509,7 +11561,7 @@
           <p:cNvPr id="28" name="Oval 27">
             <a:extLst>
               <a:ext uri="{FF2B5EF4-FFF2-40B4-BE49-F238E27FC236}">
-                <a16:creationId xmlns="" xmlns:a16="http://schemas.microsoft.com/office/drawing/2014/main" id="{787ACDD4-72C7-3A4D-AA5B-3354BABF069D}"/>
+                <a16:creationId xmlns:a16="http://schemas.microsoft.com/office/drawing/2014/main" xmlns="" id="{787ACDD4-72C7-3A4D-AA5B-3354BABF069D}"/>
               </a:ext>
             </a:extLst>
           </p:cNvPr>
@@ -11608,7 +11660,7 @@
           <p:cNvPr id="2" name="Title 1">
             <a:extLst>
               <a:ext uri="{FF2B5EF4-FFF2-40B4-BE49-F238E27FC236}">
-                <a16:creationId xmlns="" xmlns:a16="http://schemas.microsoft.com/office/drawing/2014/main" id="{63695BC3-BEC1-504D-90B9-FB04F79787AF}"/>
+                <a16:creationId xmlns:a16="http://schemas.microsoft.com/office/drawing/2014/main" xmlns="" id="{63695BC3-BEC1-504D-90B9-FB04F79787AF}"/>
               </a:ext>
             </a:extLst>
           </p:cNvPr>
@@ -11636,7 +11688,7 @@
           <p:cNvPr id="4" name="TextBox 3">
             <a:extLst>
               <a:ext uri="{FF2B5EF4-FFF2-40B4-BE49-F238E27FC236}">
-                <a16:creationId xmlns="" xmlns:a16="http://schemas.microsoft.com/office/drawing/2014/main" id="{303C0764-6E74-034B-9647-8FDBC08D2676}"/>
+                <a16:creationId xmlns:a16="http://schemas.microsoft.com/office/drawing/2014/main" xmlns="" id="{303C0764-6E74-034B-9647-8FDBC08D2676}"/>
               </a:ext>
             </a:extLst>
           </p:cNvPr>
@@ -11676,7 +11728,7 @@
           <p:cNvPr id="5" name="TextBox 4">
             <a:extLst>
               <a:ext uri="{FF2B5EF4-FFF2-40B4-BE49-F238E27FC236}">
-                <a16:creationId xmlns="" xmlns:a16="http://schemas.microsoft.com/office/drawing/2014/main" id="{FEDC0C03-AB5E-DC48-B38D-BFDF7B1A6661}"/>
+                <a16:creationId xmlns:a16="http://schemas.microsoft.com/office/drawing/2014/main" xmlns="" id="{FEDC0C03-AB5E-DC48-B38D-BFDF7B1A6661}"/>
               </a:ext>
             </a:extLst>
           </p:cNvPr>
@@ -11719,7 +11771,7 @@
           <p:cNvPr id="7" name="TextBox 6">
             <a:extLst>
               <a:ext uri="{FF2B5EF4-FFF2-40B4-BE49-F238E27FC236}">
-                <a16:creationId xmlns="" xmlns:a16="http://schemas.microsoft.com/office/drawing/2014/main" id="{E3C92A7E-C3E1-1E47-866C-10D054289EAA}"/>
+                <a16:creationId xmlns:a16="http://schemas.microsoft.com/office/drawing/2014/main" xmlns="" id="{E3C92A7E-C3E1-1E47-866C-10D054289EAA}"/>
               </a:ext>
             </a:extLst>
           </p:cNvPr>
@@ -11777,7 +11829,7 @@
           <p:cNvPr id="8" name="Oval 7">
             <a:extLst>
               <a:ext uri="{FF2B5EF4-FFF2-40B4-BE49-F238E27FC236}">
-                <a16:creationId xmlns="" xmlns:a16="http://schemas.microsoft.com/office/drawing/2014/main" id="{98E12714-002A-8F45-B772-89E1E4B6AFAD}"/>
+                <a16:creationId xmlns:a16="http://schemas.microsoft.com/office/drawing/2014/main" xmlns="" id="{98E12714-002A-8F45-B772-89E1E4B6AFAD}"/>
               </a:ext>
             </a:extLst>
           </p:cNvPr>
@@ -11827,7 +11879,7 @@
           <p:cNvPr id="9" name="Rectangle: Rounded Corners 4">
             <a:extLst>
               <a:ext uri="{FF2B5EF4-FFF2-40B4-BE49-F238E27FC236}">
-                <a16:creationId xmlns="" xmlns:a16="http://schemas.microsoft.com/office/drawing/2014/main" id="{C984AE45-7F4B-3E4E-A4AB-324EA04B080A}"/>
+                <a16:creationId xmlns:a16="http://schemas.microsoft.com/office/drawing/2014/main" xmlns="" id="{C984AE45-7F4B-3E4E-A4AB-324EA04B080A}"/>
               </a:ext>
             </a:extLst>
           </p:cNvPr>
@@ -11880,7 +11932,7 @@
           <p:cNvPr id="11" name="Straight Arrow Connector 10">
             <a:extLst>
               <a:ext uri="{FF2B5EF4-FFF2-40B4-BE49-F238E27FC236}">
-                <a16:creationId xmlns="" xmlns:a16="http://schemas.microsoft.com/office/drawing/2014/main" id="{45AAEBCF-749E-FB43-8CB1-EAEA4AE8EF88}"/>
+                <a16:creationId xmlns:a16="http://schemas.microsoft.com/office/drawing/2014/main" xmlns="" id="{45AAEBCF-749E-FB43-8CB1-EAEA4AE8EF88}"/>
               </a:ext>
             </a:extLst>
           </p:cNvPr>
@@ -11923,7 +11975,7 @@
           <p:cNvPr id="13" name="Rectangle: Rounded Corners 2">
             <a:extLst>
               <a:ext uri="{FF2B5EF4-FFF2-40B4-BE49-F238E27FC236}">
-                <a16:creationId xmlns="" xmlns:a16="http://schemas.microsoft.com/office/drawing/2014/main" id="{F43E48B1-B1C1-FA45-AE69-A78BD07EA765}"/>
+                <a16:creationId xmlns:a16="http://schemas.microsoft.com/office/drawing/2014/main" xmlns="" id="{F43E48B1-B1C1-FA45-AE69-A78BD07EA765}"/>
               </a:ext>
             </a:extLst>
           </p:cNvPr>
@@ -11976,7 +12028,7 @@
           <p:cNvPr id="14" name="Rectangle: Rounded Corners 7">
             <a:extLst>
               <a:ext uri="{FF2B5EF4-FFF2-40B4-BE49-F238E27FC236}">
-                <a16:creationId xmlns="" xmlns:a16="http://schemas.microsoft.com/office/drawing/2014/main" id="{21B78B04-1092-CF42-80A7-21846DB82B0C}"/>
+                <a16:creationId xmlns:a16="http://schemas.microsoft.com/office/drawing/2014/main" xmlns="" id="{21B78B04-1092-CF42-80A7-21846DB82B0C}"/>
               </a:ext>
             </a:extLst>
           </p:cNvPr>
@@ -12029,7 +12081,7 @@
           <p:cNvPr id="15" name="Rectangle: Rounded Corners 9">
             <a:extLst>
               <a:ext uri="{FF2B5EF4-FFF2-40B4-BE49-F238E27FC236}">
-                <a16:creationId xmlns="" xmlns:a16="http://schemas.microsoft.com/office/drawing/2014/main" id="{1AFE2ACF-FA76-624A-9515-B6DE4BD43A03}"/>
+                <a16:creationId xmlns:a16="http://schemas.microsoft.com/office/drawing/2014/main" xmlns="" id="{1AFE2ACF-FA76-624A-9515-B6DE4BD43A03}"/>
               </a:ext>
             </a:extLst>
           </p:cNvPr>
@@ -12082,7 +12134,7 @@
           <p:cNvPr id="16" name="TextBox 15">
             <a:extLst>
               <a:ext uri="{FF2B5EF4-FFF2-40B4-BE49-F238E27FC236}">
-                <a16:creationId xmlns="" xmlns:a16="http://schemas.microsoft.com/office/drawing/2014/main" id="{6E8DC8CA-6C40-B54D-A397-C376073EB55B}"/>
+                <a16:creationId xmlns:a16="http://schemas.microsoft.com/office/drawing/2014/main" xmlns="" id="{6E8DC8CA-6C40-B54D-A397-C376073EB55B}"/>
               </a:ext>
             </a:extLst>
           </p:cNvPr>
@@ -12127,7 +12179,7 @@
           <p:cNvPr id="17" name="Straight Arrow Connector 16">
             <a:extLst>
               <a:ext uri="{FF2B5EF4-FFF2-40B4-BE49-F238E27FC236}">
-                <a16:creationId xmlns="" xmlns:a16="http://schemas.microsoft.com/office/drawing/2014/main" id="{43EF946B-702D-7D42-9345-B8E6E59407C7}"/>
+                <a16:creationId xmlns:a16="http://schemas.microsoft.com/office/drawing/2014/main" xmlns="" id="{43EF946B-702D-7D42-9345-B8E6E59407C7}"/>
               </a:ext>
             </a:extLst>
           </p:cNvPr>
@@ -12170,7 +12222,7 @@
           <p:cNvPr id="18" name="Straight Arrow Connector 17">
             <a:extLst>
               <a:ext uri="{FF2B5EF4-FFF2-40B4-BE49-F238E27FC236}">
-                <a16:creationId xmlns="" xmlns:a16="http://schemas.microsoft.com/office/drawing/2014/main" id="{EF4860F9-7D27-A542-A37E-F77796CAAC23}"/>
+                <a16:creationId xmlns:a16="http://schemas.microsoft.com/office/drawing/2014/main" xmlns="" id="{EF4860F9-7D27-A542-A37E-F77796CAAC23}"/>
               </a:ext>
             </a:extLst>
           </p:cNvPr>
@@ -12213,7 +12265,7 @@
           <p:cNvPr id="19" name="Straight Arrow Connector 18">
             <a:extLst>
               <a:ext uri="{FF2B5EF4-FFF2-40B4-BE49-F238E27FC236}">
-                <a16:creationId xmlns="" xmlns:a16="http://schemas.microsoft.com/office/drawing/2014/main" id="{618A4F59-D514-A342-83E8-E31334D078F8}"/>
+                <a16:creationId xmlns:a16="http://schemas.microsoft.com/office/drawing/2014/main" xmlns="" id="{618A4F59-D514-A342-83E8-E31334D078F8}"/>
               </a:ext>
             </a:extLst>
           </p:cNvPr>
@@ -12256,7 +12308,7 @@
           <p:cNvPr id="20" name="Oval 19">
             <a:extLst>
               <a:ext uri="{FF2B5EF4-FFF2-40B4-BE49-F238E27FC236}">
-                <a16:creationId xmlns="" xmlns:a16="http://schemas.microsoft.com/office/drawing/2014/main" id="{4B1ACD04-9615-B147-8D50-5866372EAEA5}"/>
+                <a16:creationId xmlns:a16="http://schemas.microsoft.com/office/drawing/2014/main" xmlns="" id="{4B1ACD04-9615-B147-8D50-5866372EAEA5}"/>
               </a:ext>
             </a:extLst>
           </p:cNvPr>
@@ -12305,7 +12357,7 @@
           <p:cNvPr id="21" name="Oval 20">
             <a:extLst>
               <a:ext uri="{FF2B5EF4-FFF2-40B4-BE49-F238E27FC236}">
-                <a16:creationId xmlns="" xmlns:a16="http://schemas.microsoft.com/office/drawing/2014/main" id="{479A5C67-41DB-2A49-849D-E8F07512740D}"/>
+                <a16:creationId xmlns:a16="http://schemas.microsoft.com/office/drawing/2014/main" xmlns="" id="{479A5C67-41DB-2A49-849D-E8F07512740D}"/>
               </a:ext>
             </a:extLst>
           </p:cNvPr>
@@ -12355,7 +12407,7 @@
           <p:cNvPr id="22" name="Oval 21">
             <a:extLst>
               <a:ext uri="{FF2B5EF4-FFF2-40B4-BE49-F238E27FC236}">
-                <a16:creationId xmlns="" xmlns:a16="http://schemas.microsoft.com/office/drawing/2014/main" id="{2672164B-4C01-6D44-B5E7-F0293F56E78E}"/>
+                <a16:creationId xmlns:a16="http://schemas.microsoft.com/office/drawing/2014/main" xmlns="" id="{2672164B-4C01-6D44-B5E7-F0293F56E78E}"/>
               </a:ext>
             </a:extLst>
           </p:cNvPr>
@@ -12405,7 +12457,7 @@
           <p:cNvPr id="23" name="Straight Arrow Connector 22">
             <a:extLst>
               <a:ext uri="{FF2B5EF4-FFF2-40B4-BE49-F238E27FC236}">
-                <a16:creationId xmlns="" xmlns:a16="http://schemas.microsoft.com/office/drawing/2014/main" id="{C26993FA-3054-3244-8ACC-4EB79E2C6E38}"/>
+                <a16:creationId xmlns:a16="http://schemas.microsoft.com/office/drawing/2014/main" xmlns="" id="{C26993FA-3054-3244-8ACC-4EB79E2C6E38}"/>
               </a:ext>
             </a:extLst>
           </p:cNvPr>
@@ -12448,7 +12500,7 @@
           <p:cNvPr id="24" name="Straight Arrow Connector 23">
             <a:extLst>
               <a:ext uri="{FF2B5EF4-FFF2-40B4-BE49-F238E27FC236}">
-                <a16:creationId xmlns="" xmlns:a16="http://schemas.microsoft.com/office/drawing/2014/main" id="{880F0F40-144F-B542-9AA7-BE4B29F4CC42}"/>
+                <a16:creationId xmlns:a16="http://schemas.microsoft.com/office/drawing/2014/main" xmlns="" id="{880F0F40-144F-B542-9AA7-BE4B29F4CC42}"/>
               </a:ext>
             </a:extLst>
           </p:cNvPr>
@@ -12491,7 +12543,7 @@
           <p:cNvPr id="25" name="Straight Arrow Connector 24">
             <a:extLst>
               <a:ext uri="{FF2B5EF4-FFF2-40B4-BE49-F238E27FC236}">
-                <a16:creationId xmlns="" xmlns:a16="http://schemas.microsoft.com/office/drawing/2014/main" id="{E17C5110-CA13-F741-AD04-1C732E1FE1CA}"/>
+                <a16:creationId xmlns:a16="http://schemas.microsoft.com/office/drawing/2014/main" xmlns="" id="{E17C5110-CA13-F741-AD04-1C732E1FE1CA}"/>
               </a:ext>
             </a:extLst>
           </p:cNvPr>
@@ -12534,7 +12586,7 @@
           <p:cNvPr id="26" name="TextBox 25">
             <a:extLst>
               <a:ext uri="{FF2B5EF4-FFF2-40B4-BE49-F238E27FC236}">
-                <a16:creationId xmlns="" xmlns:a16="http://schemas.microsoft.com/office/drawing/2014/main" id="{6E8DC8CA-6C40-B54D-A397-C376073EB55B}"/>
+                <a16:creationId xmlns:a16="http://schemas.microsoft.com/office/drawing/2014/main" xmlns="" id="{6E8DC8CA-6C40-B54D-A397-C376073EB55B}"/>
               </a:ext>
             </a:extLst>
           </p:cNvPr>
@@ -12575,7 +12627,7 @@
           <p:cNvPr id="27" name="TextBox 26">
             <a:extLst>
               <a:ext uri="{FF2B5EF4-FFF2-40B4-BE49-F238E27FC236}">
-                <a16:creationId xmlns="" xmlns:a16="http://schemas.microsoft.com/office/drawing/2014/main" id="{6E8DC8CA-6C40-B54D-A397-C376073EB55B}"/>
+                <a16:creationId xmlns:a16="http://schemas.microsoft.com/office/drawing/2014/main" xmlns="" id="{6E8DC8CA-6C40-B54D-A397-C376073EB55B}"/>
               </a:ext>
             </a:extLst>
           </p:cNvPr>
@@ -12741,7 +12793,7 @@
           <p:cNvPr id="5" name="Oval 4">
             <a:extLst>
               <a:ext uri="{FF2B5EF4-FFF2-40B4-BE49-F238E27FC236}">
-                <a16:creationId xmlns="" xmlns:a16="http://schemas.microsoft.com/office/drawing/2014/main" id="{98E12714-002A-8F45-B772-89E1E4B6AFAD}"/>
+                <a16:creationId xmlns:a16="http://schemas.microsoft.com/office/drawing/2014/main" xmlns="" id="{98E12714-002A-8F45-B772-89E1E4B6AFAD}"/>
               </a:ext>
             </a:extLst>
           </p:cNvPr>
@@ -12791,7 +12843,7 @@
           <p:cNvPr id="6" name="Rectangle: Rounded Corners 4">
             <a:extLst>
               <a:ext uri="{FF2B5EF4-FFF2-40B4-BE49-F238E27FC236}">
-                <a16:creationId xmlns="" xmlns:a16="http://schemas.microsoft.com/office/drawing/2014/main" id="{C984AE45-7F4B-3E4E-A4AB-324EA04B080A}"/>
+                <a16:creationId xmlns:a16="http://schemas.microsoft.com/office/drawing/2014/main" xmlns="" id="{C984AE45-7F4B-3E4E-A4AB-324EA04B080A}"/>
               </a:ext>
             </a:extLst>
           </p:cNvPr>
@@ -12843,7 +12895,7 @@
           <p:cNvPr id="7" name="Straight Arrow Connector 6">
             <a:extLst>
               <a:ext uri="{FF2B5EF4-FFF2-40B4-BE49-F238E27FC236}">
-                <a16:creationId xmlns="" xmlns:a16="http://schemas.microsoft.com/office/drawing/2014/main" id="{45AAEBCF-749E-FB43-8CB1-EAEA4AE8EF88}"/>
+                <a16:creationId xmlns:a16="http://schemas.microsoft.com/office/drawing/2014/main" xmlns="" id="{45AAEBCF-749E-FB43-8CB1-EAEA4AE8EF88}"/>
               </a:ext>
             </a:extLst>
           </p:cNvPr>
@@ -12886,7 +12938,7 @@
           <p:cNvPr id="9" name="Rectangle: Rounded Corners 9">
             <a:extLst>
               <a:ext uri="{FF2B5EF4-FFF2-40B4-BE49-F238E27FC236}">
-                <a16:creationId xmlns="" xmlns:a16="http://schemas.microsoft.com/office/drawing/2014/main" id="{1AFE2ACF-FA76-624A-9515-B6DE4BD43A03}"/>
+                <a16:creationId xmlns:a16="http://schemas.microsoft.com/office/drawing/2014/main" xmlns="" id="{1AFE2ACF-FA76-624A-9515-B6DE4BD43A03}"/>
               </a:ext>
             </a:extLst>
           </p:cNvPr>
@@ -12939,7 +12991,7 @@
           <p:cNvPr id="11" name="Straight Arrow Connector 10">
             <a:extLst>
               <a:ext uri="{FF2B5EF4-FFF2-40B4-BE49-F238E27FC236}">
-                <a16:creationId xmlns="" xmlns:a16="http://schemas.microsoft.com/office/drawing/2014/main" id="{EF4860F9-7D27-A542-A37E-F77796CAAC23}"/>
+                <a16:creationId xmlns:a16="http://schemas.microsoft.com/office/drawing/2014/main" xmlns="" id="{EF4860F9-7D27-A542-A37E-F77796CAAC23}"/>
               </a:ext>
             </a:extLst>
           </p:cNvPr>
@@ -12982,7 +13034,7 @@
           <p:cNvPr id="12" name="Straight Arrow Connector 11">
             <a:extLst>
               <a:ext uri="{FF2B5EF4-FFF2-40B4-BE49-F238E27FC236}">
-                <a16:creationId xmlns="" xmlns:a16="http://schemas.microsoft.com/office/drawing/2014/main" id="{618A4F59-D514-A342-83E8-E31334D078F8}"/>
+                <a16:creationId xmlns:a16="http://schemas.microsoft.com/office/drawing/2014/main" xmlns="" id="{618A4F59-D514-A342-83E8-E31334D078F8}"/>
               </a:ext>
             </a:extLst>
           </p:cNvPr>
@@ -13025,7 +13077,7 @@
           <p:cNvPr id="15" name="Straight Arrow Connector 14">
             <a:extLst>
               <a:ext uri="{FF2B5EF4-FFF2-40B4-BE49-F238E27FC236}">
-                <a16:creationId xmlns="" xmlns:a16="http://schemas.microsoft.com/office/drawing/2014/main" id="{880F0F40-144F-B542-9AA7-BE4B29F4CC42}"/>
+                <a16:creationId xmlns:a16="http://schemas.microsoft.com/office/drawing/2014/main" xmlns="" id="{880F0F40-144F-B542-9AA7-BE4B29F4CC42}"/>
               </a:ext>
             </a:extLst>
           </p:cNvPr>
@@ -13068,7 +13120,7 @@
           <p:cNvPr id="16" name="Straight Arrow Connector 15">
             <a:extLst>
               <a:ext uri="{FF2B5EF4-FFF2-40B4-BE49-F238E27FC236}">
-                <a16:creationId xmlns="" xmlns:a16="http://schemas.microsoft.com/office/drawing/2014/main" id="{E17C5110-CA13-F741-AD04-1C732E1FE1CA}"/>
+                <a16:creationId xmlns:a16="http://schemas.microsoft.com/office/drawing/2014/main" xmlns="" id="{E17C5110-CA13-F741-AD04-1C732E1FE1CA}"/>
               </a:ext>
             </a:extLst>
           </p:cNvPr>
@@ -13111,7 +13163,7 @@
           <p:cNvPr id="17" name="TextBox 16">
             <a:extLst>
               <a:ext uri="{FF2B5EF4-FFF2-40B4-BE49-F238E27FC236}">
-                <a16:creationId xmlns="" xmlns:a16="http://schemas.microsoft.com/office/drawing/2014/main" id="{6E8DC8CA-6C40-B54D-A397-C376073EB55B}"/>
+                <a16:creationId xmlns:a16="http://schemas.microsoft.com/office/drawing/2014/main" xmlns="" id="{6E8DC8CA-6C40-B54D-A397-C376073EB55B}"/>
               </a:ext>
             </a:extLst>
           </p:cNvPr>
@@ -13148,7 +13200,7 @@
           <p:cNvPr id="27" name="TextBox 26">
             <a:extLst>
               <a:ext uri="{FF2B5EF4-FFF2-40B4-BE49-F238E27FC236}">
-                <a16:creationId xmlns="" xmlns:a16="http://schemas.microsoft.com/office/drawing/2014/main" id="{6E8DC8CA-6C40-B54D-A397-C376073EB55B}"/>
+                <a16:creationId xmlns:a16="http://schemas.microsoft.com/office/drawing/2014/main" xmlns="" id="{6E8DC8CA-6C40-B54D-A397-C376073EB55B}"/>
               </a:ext>
             </a:extLst>
           </p:cNvPr>
@@ -13185,7 +13237,7 @@
           <p:cNvPr id="32" name="Straight Arrow Connector 31">
             <a:extLst>
               <a:ext uri="{FF2B5EF4-FFF2-40B4-BE49-F238E27FC236}">
-                <a16:creationId xmlns="" xmlns:a16="http://schemas.microsoft.com/office/drawing/2014/main" id="{EF4860F9-7D27-A542-A37E-F77796CAAC23}"/>
+                <a16:creationId xmlns:a16="http://schemas.microsoft.com/office/drawing/2014/main" xmlns="" id="{EF4860F9-7D27-A542-A37E-F77796CAAC23}"/>
               </a:ext>
             </a:extLst>
           </p:cNvPr>
@@ -13228,7 +13280,7 @@
           <p:cNvPr id="37" name="Oval 36">
             <a:extLst>
               <a:ext uri="{FF2B5EF4-FFF2-40B4-BE49-F238E27FC236}">
-                <a16:creationId xmlns="" xmlns:a16="http://schemas.microsoft.com/office/drawing/2014/main" id="{479A5C67-41DB-2A49-849D-E8F07512740D}"/>
+                <a16:creationId xmlns:a16="http://schemas.microsoft.com/office/drawing/2014/main" xmlns="" id="{479A5C67-41DB-2A49-849D-E8F07512740D}"/>
               </a:ext>
             </a:extLst>
           </p:cNvPr>
@@ -13308,7 +13360,7 @@
           <p:cNvPr id="42" name="Rectangle: Rounded Corners 9">
             <a:extLst>
               <a:ext uri="{FF2B5EF4-FFF2-40B4-BE49-F238E27FC236}">
-                <a16:creationId xmlns="" xmlns:a16="http://schemas.microsoft.com/office/drawing/2014/main" id="{1AFE2ACF-FA76-624A-9515-B6DE4BD43A03}"/>
+                <a16:creationId xmlns:a16="http://schemas.microsoft.com/office/drawing/2014/main" xmlns="" id="{1AFE2ACF-FA76-624A-9515-B6DE4BD43A03}"/>
               </a:ext>
             </a:extLst>
           </p:cNvPr>
@@ -13361,7 +13413,7 @@
           <p:cNvPr id="43" name="Rectangle: Rounded Corners 9">
             <a:extLst>
               <a:ext uri="{FF2B5EF4-FFF2-40B4-BE49-F238E27FC236}">
-                <a16:creationId xmlns="" xmlns:a16="http://schemas.microsoft.com/office/drawing/2014/main" id="{1AFE2ACF-FA76-624A-9515-B6DE4BD43A03}"/>
+                <a16:creationId xmlns:a16="http://schemas.microsoft.com/office/drawing/2014/main" xmlns="" id="{1AFE2ACF-FA76-624A-9515-B6DE4BD43A03}"/>
               </a:ext>
             </a:extLst>
           </p:cNvPr>
@@ -13414,7 +13466,7 @@
           <p:cNvPr id="55" name="Oval 54">
             <a:extLst>
               <a:ext uri="{FF2B5EF4-FFF2-40B4-BE49-F238E27FC236}">
-                <a16:creationId xmlns="" xmlns:a16="http://schemas.microsoft.com/office/drawing/2014/main" id="{479A5C67-41DB-2A49-849D-E8F07512740D}"/>
+                <a16:creationId xmlns:a16="http://schemas.microsoft.com/office/drawing/2014/main" xmlns="" id="{479A5C67-41DB-2A49-849D-E8F07512740D}"/>
               </a:ext>
             </a:extLst>
           </p:cNvPr>
@@ -13464,7 +13516,7 @@
           <p:cNvPr id="56" name="Oval 55">
             <a:extLst>
               <a:ext uri="{FF2B5EF4-FFF2-40B4-BE49-F238E27FC236}">
-                <a16:creationId xmlns="" xmlns:a16="http://schemas.microsoft.com/office/drawing/2014/main" id="{479A5C67-41DB-2A49-849D-E8F07512740D}"/>
+                <a16:creationId xmlns:a16="http://schemas.microsoft.com/office/drawing/2014/main" xmlns="" id="{479A5C67-41DB-2A49-849D-E8F07512740D}"/>
               </a:ext>
             </a:extLst>
           </p:cNvPr>
@@ -13514,7 +13566,7 @@
           <p:cNvPr id="59" name="Straight Arrow Connector 58">
             <a:extLst>
               <a:ext uri="{FF2B5EF4-FFF2-40B4-BE49-F238E27FC236}">
-                <a16:creationId xmlns="" xmlns:a16="http://schemas.microsoft.com/office/drawing/2014/main" id="{880F0F40-144F-B542-9AA7-BE4B29F4CC42}"/>
+                <a16:creationId xmlns:a16="http://schemas.microsoft.com/office/drawing/2014/main" xmlns="" id="{880F0F40-144F-B542-9AA7-BE4B29F4CC42}"/>
               </a:ext>
             </a:extLst>
           </p:cNvPr>
@@ -13557,7 +13609,7 @@
           <p:cNvPr id="77" name="TextBox 76">
             <a:extLst>
               <a:ext uri="{FF2B5EF4-FFF2-40B4-BE49-F238E27FC236}">
-                <a16:creationId xmlns="" xmlns:a16="http://schemas.microsoft.com/office/drawing/2014/main" id="{6E8DC8CA-6C40-B54D-A397-C376073EB55B}"/>
+                <a16:creationId xmlns:a16="http://schemas.microsoft.com/office/drawing/2014/main" xmlns="" id="{6E8DC8CA-6C40-B54D-A397-C376073EB55B}"/>
               </a:ext>
             </a:extLst>
           </p:cNvPr>
@@ -13684,7 +13736,7 @@
           <p:cNvPr id="81" name="Rectangle: Rounded Corners 9">
             <a:extLst>
               <a:ext uri="{FF2B5EF4-FFF2-40B4-BE49-F238E27FC236}">
-                <a16:creationId xmlns="" xmlns:a16="http://schemas.microsoft.com/office/drawing/2014/main" id="{1AFE2ACF-FA76-624A-9515-B6DE4BD43A03}"/>
+                <a16:creationId xmlns:a16="http://schemas.microsoft.com/office/drawing/2014/main" xmlns="" id="{1AFE2ACF-FA76-624A-9515-B6DE4BD43A03}"/>
               </a:ext>
             </a:extLst>
           </p:cNvPr>
@@ -13737,7 +13789,7 @@
           <p:cNvPr id="82" name="Straight Arrow Connector 81">
             <a:extLst>
               <a:ext uri="{FF2B5EF4-FFF2-40B4-BE49-F238E27FC236}">
-                <a16:creationId xmlns="" xmlns:a16="http://schemas.microsoft.com/office/drawing/2014/main" id="{880F0F40-144F-B542-9AA7-BE4B29F4CC42}"/>
+                <a16:creationId xmlns:a16="http://schemas.microsoft.com/office/drawing/2014/main" xmlns="" id="{880F0F40-144F-B542-9AA7-BE4B29F4CC42}"/>
               </a:ext>
             </a:extLst>
           </p:cNvPr>
@@ -13779,7 +13831,7 @@
           <p:cNvPr id="83" name="Oval 82">
             <a:extLst>
               <a:ext uri="{FF2B5EF4-FFF2-40B4-BE49-F238E27FC236}">
-                <a16:creationId xmlns="" xmlns:a16="http://schemas.microsoft.com/office/drawing/2014/main" id="{479A5C67-41DB-2A49-849D-E8F07512740D}"/>
+                <a16:creationId xmlns:a16="http://schemas.microsoft.com/office/drawing/2014/main" xmlns="" id="{479A5C67-41DB-2A49-849D-E8F07512740D}"/>
               </a:ext>
             </a:extLst>
           </p:cNvPr>
@@ -13829,7 +13881,7 @@
           <p:cNvPr id="84" name="Straight Arrow Connector 83">
             <a:extLst>
               <a:ext uri="{FF2B5EF4-FFF2-40B4-BE49-F238E27FC236}">
-                <a16:creationId xmlns="" xmlns:a16="http://schemas.microsoft.com/office/drawing/2014/main" id="{EF4860F9-7D27-A542-A37E-F77796CAAC23}"/>
+                <a16:creationId xmlns:a16="http://schemas.microsoft.com/office/drawing/2014/main" xmlns="" id="{EF4860F9-7D27-A542-A37E-F77796CAAC23}"/>
               </a:ext>
             </a:extLst>
           </p:cNvPr>
@@ -13991,11 +14043,11 @@
           <a:p>
             <a:r>
               <a:rPr lang="en-US" dirty="0"/>
-              <a:t>Competing Consumers </a:t>
+              <a:t>Competing </a:t>
             </a:r>
             <a:r>
               <a:rPr lang="en-US" dirty="0" smtClean="0"/>
-              <a:t> / Retry Delay Demo</a:t>
+              <a:t>Consumers</a:t>
             </a:r>
             <a:endParaRPr lang="en-US" dirty="0"/>
           </a:p>
@@ -14435,7 +14487,7 @@
           <p:cNvPr id="2" name="Title 1">
             <a:extLst>
               <a:ext uri="{FF2B5EF4-FFF2-40B4-BE49-F238E27FC236}">
-                <a16:creationId xmlns="" xmlns:a16="http://schemas.microsoft.com/office/drawing/2014/main" id="{AC7722AF-A2F1-EA42-9015-BE9DB6B90BA9}"/>
+                <a16:creationId xmlns:a16="http://schemas.microsoft.com/office/drawing/2014/main" xmlns="" id="{AC7722AF-A2F1-EA42-9015-BE9DB6B90BA9}"/>
               </a:ext>
             </a:extLst>
           </p:cNvPr>
@@ -14472,7 +14524,7 @@
           <p:cNvPr id="3" name="Content Placeholder 2">
             <a:extLst>
               <a:ext uri="{FF2B5EF4-FFF2-40B4-BE49-F238E27FC236}">
-                <a16:creationId xmlns="" xmlns:a16="http://schemas.microsoft.com/office/drawing/2014/main" id="{281E53C3-C76E-E246-B811-36479B204C6E}"/>
+                <a16:creationId xmlns:a16="http://schemas.microsoft.com/office/drawing/2014/main" xmlns="" id="{281E53C3-C76E-E246-B811-36479B204C6E}"/>
               </a:ext>
             </a:extLst>
           </p:cNvPr>
@@ -14671,7 +14723,7 @@
           <p:cNvPr id="2" name="Title 1">
             <a:extLst>
               <a:ext uri="{FF2B5EF4-FFF2-40B4-BE49-F238E27FC236}">
-                <a16:creationId xmlns="" xmlns:a16="http://schemas.microsoft.com/office/drawing/2014/main" id="{D19D98D7-1A37-3B46-9F52-28196C859D7B}"/>
+                <a16:creationId xmlns:a16="http://schemas.microsoft.com/office/drawing/2014/main" xmlns="" id="{D19D98D7-1A37-3B46-9F52-28196C859D7B}"/>
               </a:ext>
             </a:extLst>
           </p:cNvPr>
@@ -14699,7 +14751,7 @@
           <p:cNvPr id="3" name="Content Placeholder 2">
             <a:extLst>
               <a:ext uri="{FF2B5EF4-FFF2-40B4-BE49-F238E27FC236}">
-                <a16:creationId xmlns="" xmlns:a16="http://schemas.microsoft.com/office/drawing/2014/main" id="{886AE7E1-E8C6-9946-9790-4CC0B63F0BDC}"/>
+                <a16:creationId xmlns:a16="http://schemas.microsoft.com/office/drawing/2014/main" xmlns="" id="{886AE7E1-E8C6-9946-9790-4CC0B63F0BDC}"/>
               </a:ext>
             </a:extLst>
           </p:cNvPr>
@@ -14937,7 +14989,7 @@
           <p:cNvPr id="2" name="Title 1">
             <a:extLst>
               <a:ext uri="{FF2B5EF4-FFF2-40B4-BE49-F238E27FC236}">
-                <a16:creationId xmlns="" xmlns:a16="http://schemas.microsoft.com/office/drawing/2014/main" id="{3750261F-01B5-314F-9B46-E0A4FAD43627}"/>
+                <a16:creationId xmlns:a16="http://schemas.microsoft.com/office/drawing/2014/main" xmlns="" id="{3750261F-01B5-314F-9B46-E0A4FAD43627}"/>
               </a:ext>
             </a:extLst>
           </p:cNvPr>
@@ -14965,7 +15017,7 @@
           <p:cNvPr id="3" name="Content Placeholder 2">
             <a:extLst>
               <a:ext uri="{FF2B5EF4-FFF2-40B4-BE49-F238E27FC236}">
-                <a16:creationId xmlns="" xmlns:a16="http://schemas.microsoft.com/office/drawing/2014/main" id="{7DB9A663-ECCD-B74B-830D-F0EE31879A9E}"/>
+                <a16:creationId xmlns:a16="http://schemas.microsoft.com/office/drawing/2014/main" xmlns="" id="{7DB9A663-ECCD-B74B-830D-F0EE31879A9E}"/>
               </a:ext>
             </a:extLst>
           </p:cNvPr>
@@ -15764,7 +15816,7 @@
           <p:cNvPr id="2" name="Title 1">
             <a:extLst>
               <a:ext uri="{FF2B5EF4-FFF2-40B4-BE49-F238E27FC236}">
-                <a16:creationId xmlns="" xmlns:a16="http://schemas.microsoft.com/office/drawing/2014/main" id="{78D74565-72C9-4B4E-BF3A-366A5626F7A4}"/>
+                <a16:creationId xmlns:a16="http://schemas.microsoft.com/office/drawing/2014/main" xmlns="" id="{78D74565-72C9-4B4E-BF3A-366A5626F7A4}"/>
               </a:ext>
             </a:extLst>
           </p:cNvPr>
@@ -15792,7 +15844,7 @@
           <p:cNvPr id="3" name="Content Placeholder 2">
             <a:extLst>
               <a:ext uri="{FF2B5EF4-FFF2-40B4-BE49-F238E27FC236}">
-                <a16:creationId xmlns="" xmlns:a16="http://schemas.microsoft.com/office/drawing/2014/main" id="{8D949DA3-C480-B44B-8373-4A468AD836F2}"/>
+                <a16:creationId xmlns:a16="http://schemas.microsoft.com/office/drawing/2014/main" xmlns="" id="{8D949DA3-C480-B44B-8373-4A468AD836F2}"/>
               </a:ext>
             </a:extLst>
           </p:cNvPr>
@@ -18830,6 +18882,15 @@
 </file>
 
 <file path=customXml/item1.xml><?xml version="1.0" encoding="utf-8"?>
+<?mso-contentType ?>
+<FormTemplates xmlns="http://schemas.microsoft.com/sharepoint/v3/contenttype/forms">
+  <Display>DocumentLibraryForm</Display>
+  <Edit>AssetEditForm</Edit>
+  <New>DocumentLibraryForm</New>
+</FormTemplates>
+</file>
+
+<file path=customXml/item2.xml><?xml version="1.0" encoding="utf-8"?>
 <ct:contentTypeSchema xmlns:ct="http://schemas.microsoft.com/office/2006/metadata/contentType" xmlns:ma="http://schemas.microsoft.com/office/2006/metadata/properties/metaAttributes" ct:_="" ma:_="" ma:contentTypeName="TemplateFile" ma:contentTypeID="0x0101006EDDDB5EE6D98C44930B742096920B300400F5B6D36B3EF94B4E9A635CDF2A18F5B8" ma:contentTypeVersion="72" ma:contentTypeDescription="Create a new document." ma:contentTypeScope="" ma:versionID="a23e56308344d904b51738559c3d67c9">
   <xsd:schema xmlns:xsd="http://www.w3.org/2001/XMLSchema" xmlns:xs="http://www.w3.org/2001/XMLSchema" xmlns:p="http://schemas.microsoft.com/office/2006/metadata/properties" xmlns:ns2="4873beb7-5857-4685-be1f-d57550cc96cc" targetNamespace="http://schemas.microsoft.com/office/2006/metadata/properties" ma:root="true" ma:fieldsID="cd0908cc4600e77bf5da051303e00c8d" ns2:_="">
     <xsd:import namespace="4873beb7-5857-4685-be1f-d57550cc96cc"/>
@@ -19869,15 +19930,6 @@
 </ct:contentTypeSchema>
 </file>
 
-<file path=customXml/item2.xml><?xml version="1.0" encoding="utf-8"?>
-<?mso-contentType ?>
-<FormTemplates xmlns="http://schemas.microsoft.com/sharepoint/v3/contenttype/forms">
-  <Display>DocumentLibraryForm</Display>
-  <Edit>AssetEditForm</Edit>
-  <New>DocumentLibraryForm</New>
-</FormTemplates>
-</file>
-
 <file path=customXml/item3.xml><?xml version="1.0" encoding="utf-8"?>
 <p:properties xmlns:p="http://schemas.microsoft.com/office/2006/metadata/properties" xmlns:xsi="http://www.w3.org/2001/XMLSchema-instance" xmlns:pc="http://schemas.microsoft.com/office/infopath/2007/PartnerControls">
   <documentManagement>
@@ -20015,6 +20067,14 @@
 </file>
 
 <file path=customXml/itemProps1.xml><?xml version="1.0" encoding="utf-8"?>
+<ds:datastoreItem xmlns:ds="http://schemas.openxmlformats.org/officeDocument/2006/customXml" ds:itemID="{3836F65B-1B07-41EE-A0E8-BC6EF3855225}">
+  <ds:schemaRefs>
+    <ds:schemaRef ds:uri="http://schemas.microsoft.com/sharepoint/v3/contenttype/forms"/>
+  </ds:schemaRefs>
+</ds:datastoreItem>
+</file>
+
+<file path=customXml/itemProps2.xml><?xml version="1.0" encoding="utf-8"?>
 <ds:datastoreItem xmlns:ds="http://schemas.openxmlformats.org/officeDocument/2006/customXml" ds:itemID="{A09BF4D4-EF60-4196-BFC3-9462D607978C}">
   <ds:schemaRefs>
     <ds:schemaRef ds:uri="http://schemas.microsoft.com/office/2006/metadata/contentType"/>
@@ -20029,14 +20089,6 @@
     <ds:schemaRef ds:uri="http://purl.org/dc/elements/1.1/"/>
     <ds:schemaRef ds:uri="http://purl.org/dc/terms/"/>
     <ds:schemaRef ds:uri="http://schemas.microsoft.com/internal/obd"/>
-  </ds:schemaRefs>
-</ds:datastoreItem>
-</file>
-
-<file path=customXml/itemProps2.xml><?xml version="1.0" encoding="utf-8"?>
-<ds:datastoreItem xmlns:ds="http://schemas.openxmlformats.org/officeDocument/2006/customXml" ds:itemID="{3836F65B-1B07-41EE-A0E8-BC6EF3855225}">
-  <ds:schemaRefs>
-    <ds:schemaRef ds:uri="http://schemas.microsoft.com/sharepoint/v3/contenttype/forms"/>
   </ds:schemaRefs>
 </ds:datastoreItem>
 </file>

</xml_diff>